<commit_message>
Frequent Misunderstandings of OSS licenses V7の再アップ
ライセンスCC0 1.0にリンクしました。
</commit_message>
<xml_diff>
--- a/Education_Material/FAQ/Misunderstandings_of_OSS_licenses_CC0.pptx
+++ b/Education_Material/FAQ/Misunderstandings_of_OSS_licenses_CC0.pptx
@@ -293,7 +293,7 @@
           <a:p>
             <a:fld id="{7EE8F3AE-FD72-4533-A5FB-266F0DC61623}" type="datetimeFigureOut">
               <a:rPr kumimoji="1" lang="ja-JP" altLang="en-US" smtClean="0"/>
-              <a:t>2022/1/5</a:t>
+              <a:t>2022/1/6</a:t>
             </a:fld>
             <a:endParaRPr kumimoji="1" lang="ja-JP" altLang="en-US"/>
           </a:p>
@@ -466,7 +466,7 @@
           <a:p>
             <a:fld id="{F0F040E9-6AB7-471E-8A6F-82F6EB81B1F8}" type="datetimeFigureOut">
               <a:rPr kumimoji="1" lang="ja-JP" altLang="en-US" smtClean="0"/>
-              <a:t>2022/1/5</a:t>
+              <a:t>2022/1/6</a:t>
             </a:fld>
             <a:endParaRPr kumimoji="1" lang="ja-JP" altLang="en-US"/>
           </a:p>
@@ -7106,7 +7106,7 @@
           <a:p>
             <a:fld id="{8CA85632-6543-417D-AA37-747D5FCD144A}" type="datetime1">
               <a:rPr kumimoji="1" lang="ja-JP" altLang="en-US" smtClean="0"/>
-              <a:t>2022/1/5</a:t>
+              <a:t>2022/1/6</a:t>
             </a:fld>
             <a:endParaRPr kumimoji="1" lang="ja-JP" altLang="en-US"/>
           </a:p>
@@ -7310,7 +7310,7 @@
           <a:p>
             <a:fld id="{B06565E3-0D02-4356-A8E4-34212A8E714C}" type="datetime1">
               <a:rPr kumimoji="1" lang="ja-JP" altLang="en-US" smtClean="0"/>
-              <a:t>2022/1/5</a:t>
+              <a:t>2022/1/6</a:t>
             </a:fld>
             <a:endParaRPr kumimoji="1" lang="ja-JP" altLang="en-US"/>
           </a:p>
@@ -7663,7 +7663,7 @@
           <a:p>
             <a:fld id="{D1AE0380-F014-4923-9788-A7EEF4DBE4AF}" type="datetime1">
               <a:rPr kumimoji="1" lang="ja-JP" altLang="en-US" smtClean="0"/>
-              <a:t>2022/1/5</a:t>
+              <a:t>2022/1/6</a:t>
             </a:fld>
             <a:endParaRPr kumimoji="1" lang="ja-JP" altLang="en-US"/>
           </a:p>
@@ -7784,7 +7784,7 @@
           <a:p>
             <a:fld id="{E820F06B-049D-4BD4-9820-27A6981014E2}" type="datetime1">
               <a:rPr kumimoji="1" lang="ja-JP" altLang="en-US" smtClean="0"/>
-              <a:t>2022/1/5</a:t>
+              <a:t>2022/1/6</a:t>
             </a:fld>
             <a:endParaRPr kumimoji="1" lang="ja-JP" altLang="en-US"/>
           </a:p>
@@ -7883,7 +7883,7 @@
           <a:p>
             <a:fld id="{63B99404-B2ED-46D2-9FEA-10E2217461D3}" type="datetime1">
               <a:rPr kumimoji="1" lang="ja-JP" altLang="en-US" smtClean="0"/>
-              <a:t>2022/1/5</a:t>
+              <a:t>2022/1/6</a:t>
             </a:fld>
             <a:endParaRPr kumimoji="1" lang="ja-JP" altLang="en-US"/>
           </a:p>
@@ -8130,7 +8130,7 @@
           <a:p>
             <a:fld id="{F8226610-8A1B-469C-9F96-3C27427A06DB}" type="datetime1">
               <a:rPr kumimoji="1" lang="ja-JP" altLang="en-US" smtClean="0"/>
-              <a:t>2022/1/5</a:t>
+              <a:t>2022/1/6</a:t>
             </a:fld>
             <a:endParaRPr kumimoji="1" lang="ja-JP" altLang="en-US"/>
           </a:p>
@@ -8590,23 +8590,7 @@
                 <a:ea typeface="Meiryo UI" panose="020B0604030504040204" pitchFamily="50" charset="-128"/>
                 <a:cs typeface="Meiryo UI" panose="020B0604030504040204" pitchFamily="50" charset="-128"/>
               </a:rPr>
-              <a:t>licenses</a:t>
-            </a:r>
-            <a:r>
-              <a:rPr lang="ja-JP" altLang="en-US" sz="4000" dirty="0">
-                <a:latin typeface="Meiryo UI" panose="020B0604030504040204" pitchFamily="50" charset="-128"/>
-                <a:ea typeface="Meiryo UI" panose="020B0604030504040204" pitchFamily="50" charset="-128"/>
-                <a:cs typeface="Meiryo UI" panose="020B0604030504040204" pitchFamily="50" charset="-128"/>
-              </a:rPr>
-              <a:t>　</a:t>
-            </a:r>
-            <a:r>
-              <a:rPr lang="en-US" altLang="ja-JP" sz="4000" dirty="0">
-                <a:latin typeface="Meiryo UI" panose="020B0604030504040204" pitchFamily="50" charset="-128"/>
-                <a:ea typeface="Meiryo UI" panose="020B0604030504040204" pitchFamily="50" charset="-128"/>
-                <a:cs typeface="Meiryo UI" panose="020B0604030504040204" pitchFamily="50" charset="-128"/>
-              </a:rPr>
-              <a:t>V7</a:t>
+              <a:t>licenses V7</a:t>
             </a:r>
             <a:endParaRPr kumimoji="1" lang="ja-JP" altLang="en-US" sz="4000" dirty="0"/>
           </a:p>
@@ -8779,7 +8763,30 @@
                 <a:ea typeface="Meiryo UI" panose="020B0604030504040204" pitchFamily="50" charset="-128"/>
                 <a:cs typeface="Meiryo UI" panose="020B0604030504040204" pitchFamily="50" charset="-128"/>
               </a:rPr>
-              <a:t>for this document can be used under the CC0-1.0(Public Domain).  </a:t>
+              <a:t>for this document can be used under the </a:t>
+            </a:r>
+            <a:r>
+              <a:rPr lang="en-US" altLang="ja-JP" sz="2400" dirty="0">
+                <a:solidFill>
+                  <a:schemeClr val="tx1"/>
+                </a:solidFill>
+                <a:latin typeface="Meiryo UI" panose="020B0604030504040204" pitchFamily="50" charset="-128"/>
+                <a:ea typeface="Meiryo UI" panose="020B0604030504040204" pitchFamily="50" charset="-128"/>
+                <a:cs typeface="Meiryo UI" panose="020B0604030504040204" pitchFamily="50" charset="-128"/>
+                <a:hlinkClick r:id="rId4"/>
+              </a:rPr>
+              <a:t>Creative Commons CC0 1.0 Universal</a:t>
+            </a:r>
+            <a:r>
+              <a:rPr lang="en-US" altLang="ja-JP" sz="2200" dirty="0">
+                <a:solidFill>
+                  <a:schemeClr val="tx1"/>
+                </a:solidFill>
+                <a:latin typeface="Meiryo UI" panose="020B0604030504040204" pitchFamily="50" charset="-128"/>
+                <a:ea typeface="Meiryo UI" panose="020B0604030504040204" pitchFamily="50" charset="-128"/>
+                <a:cs typeface="Meiryo UI" panose="020B0604030504040204" pitchFamily="50" charset="-128"/>
+              </a:rPr>
+              <a:t>.  </a:t>
             </a:r>
           </a:p>
           <a:p>
@@ -8836,7 +8843,7 @@
                 <a:latin typeface="Meiryo UI" panose="020B0604030504040204" pitchFamily="50" charset="-128"/>
                 <a:ea typeface="Meiryo UI" panose="020B0604030504040204" pitchFamily="50" charset="-128"/>
                 <a:cs typeface="Meiryo UI" panose="020B0604030504040204" pitchFamily="50" charset="-128"/>
-                <a:hlinkClick r:id="rId4"/>
+                <a:hlinkClick r:id="rId5"/>
               </a:rPr>
               <a:t>OpenChain</a:t>
             </a:r>
@@ -8848,7 +8855,7 @@
                 <a:latin typeface="Meiryo UI" panose="020B0604030504040204" pitchFamily="50" charset="-128"/>
                 <a:ea typeface="Meiryo UI" panose="020B0604030504040204" pitchFamily="50" charset="-128"/>
                 <a:cs typeface="Meiryo UI" panose="020B0604030504040204" pitchFamily="50" charset="-128"/>
-                <a:hlinkClick r:id="rId4"/>
+                <a:hlinkClick r:id="rId5"/>
               </a:rPr>
               <a:t> Japan WG</a:t>
             </a:r>
@@ -8911,7 +8918,7 @@
                 <a:latin typeface="Meiryo UI" panose="020B0604030504040204" pitchFamily="50" charset="-128"/>
                 <a:ea typeface="Meiryo UI" panose="020B0604030504040204" pitchFamily="50" charset="-128"/>
                 <a:cs typeface="Meiryo UI" panose="020B0604030504040204" pitchFamily="50" charset="-128"/>
-                <a:hlinkClick r:id="rId5"/>
+                <a:hlinkClick r:id="rId6"/>
               </a:rPr>
               <a:t>OpenSource</a:t>
             </a:r>
@@ -8923,7 +8930,7 @@
                 <a:latin typeface="Meiryo UI" panose="020B0604030504040204" pitchFamily="50" charset="-128"/>
                 <a:ea typeface="Meiryo UI" panose="020B0604030504040204" pitchFamily="50" charset="-128"/>
                 <a:cs typeface="Meiryo UI" panose="020B0604030504040204" pitchFamily="50" charset="-128"/>
-                <a:hlinkClick r:id="rId5"/>
+                <a:hlinkClick r:id="rId6"/>
               </a:rPr>
               <a:t> License Laboratory</a:t>
             </a:r>
@@ -9552,10 +9559,10 @@
       </p:sp>
       <p:sp>
         <p:nvSpPr>
-          <p:cNvPr id="17" name="スライド番号プレースホルダー 16">
+          <p:cNvPr id="7" name="スライド番号プレースホルダー 6">
             <a:extLst>
               <a:ext uri="{FF2B5EF4-FFF2-40B4-BE49-F238E27FC236}">
-                <a16:creationId xmlns:a16="http://schemas.microsoft.com/office/drawing/2014/main" id="{99174534-593F-4C80-8139-CEB47E4AE110}"/>
+                <a16:creationId xmlns:a16="http://schemas.microsoft.com/office/drawing/2014/main" id="{F63848E7-205A-4C95-888A-0E14EAA4B25C}"/>
               </a:ext>
             </a:extLst>
           </p:cNvPr>
@@ -10157,10 +10164,10 @@
       </p:sp>
       <p:sp>
         <p:nvSpPr>
-          <p:cNvPr id="16" name="スライド番号プレースホルダー 15">
+          <p:cNvPr id="12" name="スライド番号プレースホルダー 11">
             <a:extLst>
               <a:ext uri="{FF2B5EF4-FFF2-40B4-BE49-F238E27FC236}">
-                <a16:creationId xmlns:a16="http://schemas.microsoft.com/office/drawing/2014/main" id="{0F5E19DB-D926-405A-8A3D-5DEC9EB60E30}"/>
+                <a16:creationId xmlns:a16="http://schemas.microsoft.com/office/drawing/2014/main" id="{9A8A51DF-97B5-4F6B-9F1F-4AF0DDB035FF}"/>
               </a:ext>
             </a:extLst>
           </p:cNvPr>
@@ -10762,10 +10769,10 @@
       </p:sp>
       <p:sp>
         <p:nvSpPr>
-          <p:cNvPr id="17" name="スライド番号プレースホルダー 16">
+          <p:cNvPr id="7" name="スライド番号プレースホルダー 6">
             <a:extLst>
               <a:ext uri="{FF2B5EF4-FFF2-40B4-BE49-F238E27FC236}">
-                <a16:creationId xmlns:a16="http://schemas.microsoft.com/office/drawing/2014/main" id="{49C0B18F-0230-4F52-B5C3-CCC20EC9E576}"/>
+                <a16:creationId xmlns:a16="http://schemas.microsoft.com/office/drawing/2014/main" id="{396A6D68-6151-4CB7-B1A4-8BED64B4F879}"/>
               </a:ext>
             </a:extLst>
           </p:cNvPr>
@@ -11298,10 +11305,10 @@
       </p:sp>
       <p:sp>
         <p:nvSpPr>
-          <p:cNvPr id="16" name="スライド番号プレースホルダー 15">
+          <p:cNvPr id="12" name="スライド番号プレースホルダー 11">
             <a:extLst>
               <a:ext uri="{FF2B5EF4-FFF2-40B4-BE49-F238E27FC236}">
-                <a16:creationId xmlns:a16="http://schemas.microsoft.com/office/drawing/2014/main" id="{F3450804-E7B9-40DC-BF44-A339433C1340}"/>
+                <a16:creationId xmlns:a16="http://schemas.microsoft.com/office/drawing/2014/main" id="{EA642DAA-145A-40D5-9EEA-A71101103DB5}"/>
               </a:ext>
             </a:extLst>
           </p:cNvPr>
@@ -11832,10 +11839,10 @@
       </p:sp>
       <p:sp>
         <p:nvSpPr>
-          <p:cNvPr id="15" name="スライド番号プレースホルダー 14">
+          <p:cNvPr id="7" name="スライド番号プレースホルダー 6">
             <a:extLst>
               <a:ext uri="{FF2B5EF4-FFF2-40B4-BE49-F238E27FC236}">
-                <a16:creationId xmlns:a16="http://schemas.microsoft.com/office/drawing/2014/main" id="{C225C3A1-A83F-4F83-A1E4-7115C5BB865B}"/>
+                <a16:creationId xmlns:a16="http://schemas.microsoft.com/office/drawing/2014/main" id="{DA94CD78-9790-4BAE-A3D5-3334237904D3}"/>
               </a:ext>
             </a:extLst>
           </p:cNvPr>
@@ -12395,10 +12402,10 @@
       </p:sp>
       <p:sp>
         <p:nvSpPr>
-          <p:cNvPr id="16" name="スライド番号プレースホルダー 15">
+          <p:cNvPr id="7" name="スライド番号プレースホルダー 6">
             <a:extLst>
               <a:ext uri="{FF2B5EF4-FFF2-40B4-BE49-F238E27FC236}">
-                <a16:creationId xmlns:a16="http://schemas.microsoft.com/office/drawing/2014/main" id="{5F0FC656-70B4-435F-A849-673F819C176C}"/>
+                <a16:creationId xmlns:a16="http://schemas.microsoft.com/office/drawing/2014/main" id="{2BD9833B-9E7F-4E9B-ABBC-8A292B98E8F1}"/>
               </a:ext>
             </a:extLst>
           </p:cNvPr>
@@ -12929,10 +12936,10 @@
       </p:sp>
       <p:sp>
         <p:nvSpPr>
-          <p:cNvPr id="16" name="スライド番号プレースホルダー 15">
+          <p:cNvPr id="7" name="スライド番号プレースホルダー 6">
             <a:extLst>
               <a:ext uri="{FF2B5EF4-FFF2-40B4-BE49-F238E27FC236}">
-                <a16:creationId xmlns:a16="http://schemas.microsoft.com/office/drawing/2014/main" id="{B0E6DCD0-84C4-4FBB-9A80-98ED6035F931}"/>
+                <a16:creationId xmlns:a16="http://schemas.microsoft.com/office/drawing/2014/main" id="{C87529DE-11A3-460D-9D1E-89EBE28B1B6F}"/>
               </a:ext>
             </a:extLst>
           </p:cNvPr>
@@ -13503,10 +13510,10 @@
       </p:sp>
       <p:sp>
         <p:nvSpPr>
-          <p:cNvPr id="17" name="スライド番号プレースホルダー 16">
+          <p:cNvPr id="7" name="スライド番号プレースホルダー 6">
             <a:extLst>
               <a:ext uri="{FF2B5EF4-FFF2-40B4-BE49-F238E27FC236}">
-                <a16:creationId xmlns:a16="http://schemas.microsoft.com/office/drawing/2014/main" id="{AFA51AD5-2B21-40FC-9C8E-037C52FF1EF9}"/>
+                <a16:creationId xmlns:a16="http://schemas.microsoft.com/office/drawing/2014/main" id="{16003564-6046-4D26-ADDF-C9FA8CCAF01A}"/>
               </a:ext>
             </a:extLst>
           </p:cNvPr>
@@ -14099,10 +14106,10 @@
       </p:sp>
       <p:sp>
         <p:nvSpPr>
-          <p:cNvPr id="16" name="スライド番号プレースホルダー 15">
+          <p:cNvPr id="12" name="スライド番号プレースホルダー 11">
             <a:extLst>
               <a:ext uri="{FF2B5EF4-FFF2-40B4-BE49-F238E27FC236}">
-                <a16:creationId xmlns:a16="http://schemas.microsoft.com/office/drawing/2014/main" id="{4307BD52-70EB-4E59-962A-92CA047257D8}"/>
+                <a16:creationId xmlns:a16="http://schemas.microsoft.com/office/drawing/2014/main" id="{16AE90CB-E853-4E46-A0A3-0931CD77E5B7}"/>
               </a:ext>
             </a:extLst>
           </p:cNvPr>
@@ -14687,10 +14694,10 @@
       </p:sp>
       <p:sp>
         <p:nvSpPr>
-          <p:cNvPr id="16" name="スライド番号プレースホルダー 15">
+          <p:cNvPr id="12" name="スライド番号プレースホルダー 11">
             <a:extLst>
               <a:ext uri="{FF2B5EF4-FFF2-40B4-BE49-F238E27FC236}">
-                <a16:creationId xmlns:a16="http://schemas.microsoft.com/office/drawing/2014/main" id="{B4833F25-929C-42C5-9102-D016F8E4CDFA}"/>
+                <a16:creationId xmlns:a16="http://schemas.microsoft.com/office/drawing/2014/main" id="{2205561E-7423-4AAE-819B-FDA355A6A28C}"/>
               </a:ext>
             </a:extLst>
           </p:cNvPr>
@@ -15677,10 +15684,10 @@
       </p:sp>
       <p:sp>
         <p:nvSpPr>
-          <p:cNvPr id="10" name="スライド番号プレースホルダー 9">
+          <p:cNvPr id="5" name="スライド番号プレースホルダー 4">
             <a:extLst>
               <a:ext uri="{FF2B5EF4-FFF2-40B4-BE49-F238E27FC236}">
-                <a16:creationId xmlns:a16="http://schemas.microsoft.com/office/drawing/2014/main" id="{50EB3408-ACB5-401A-BC53-1414FBD61F80}"/>
+                <a16:creationId xmlns:a16="http://schemas.microsoft.com/office/drawing/2014/main" id="{8B2E2EBE-BF7A-4C28-9B32-DEE949D6D51A}"/>
               </a:ext>
             </a:extLst>
           </p:cNvPr>
@@ -16231,10 +16238,10 @@
       </p:sp>
       <p:sp>
         <p:nvSpPr>
-          <p:cNvPr id="17" name="スライド番号プレースホルダー 16">
+          <p:cNvPr id="7" name="スライド番号プレースホルダー 6">
             <a:extLst>
               <a:ext uri="{FF2B5EF4-FFF2-40B4-BE49-F238E27FC236}">
-                <a16:creationId xmlns:a16="http://schemas.microsoft.com/office/drawing/2014/main" id="{81FF2ACA-2D22-4AEA-A71A-2811662D429D}"/>
+                <a16:creationId xmlns:a16="http://schemas.microsoft.com/office/drawing/2014/main" id="{719C7321-BA23-499F-B2D1-4E1B110AD5B8}"/>
               </a:ext>
             </a:extLst>
           </p:cNvPr>
@@ -16843,10 +16850,10 @@
       </p:sp>
       <p:sp>
         <p:nvSpPr>
-          <p:cNvPr id="16" name="スライド番号プレースホルダー 15">
+          <p:cNvPr id="7" name="スライド番号プレースホルダー 6">
             <a:extLst>
               <a:ext uri="{FF2B5EF4-FFF2-40B4-BE49-F238E27FC236}">
-                <a16:creationId xmlns:a16="http://schemas.microsoft.com/office/drawing/2014/main" id="{954877E9-BD1D-40DA-898F-1999F1B95EEB}"/>
+                <a16:creationId xmlns:a16="http://schemas.microsoft.com/office/drawing/2014/main" id="{1B93EAF8-78C3-450C-9577-3529C5BCD4A0}"/>
               </a:ext>
             </a:extLst>
           </p:cNvPr>
@@ -17429,10 +17436,10 @@
       </p:sp>
       <p:sp>
         <p:nvSpPr>
-          <p:cNvPr id="16" name="スライド番号プレースホルダー 15">
+          <p:cNvPr id="12" name="スライド番号プレースホルダー 11">
             <a:extLst>
               <a:ext uri="{FF2B5EF4-FFF2-40B4-BE49-F238E27FC236}">
-                <a16:creationId xmlns:a16="http://schemas.microsoft.com/office/drawing/2014/main" id="{681590D5-4A33-410E-A9E3-43163EB00E63}"/>
+                <a16:creationId xmlns:a16="http://schemas.microsoft.com/office/drawing/2014/main" id="{210728E4-C1FE-4961-AFFB-A5E3E541BA49}"/>
               </a:ext>
             </a:extLst>
           </p:cNvPr>
@@ -17973,10 +17980,10 @@
       </p:sp>
       <p:sp>
         <p:nvSpPr>
-          <p:cNvPr id="16" name="スライド番号プレースホルダー 15">
+          <p:cNvPr id="12" name="スライド番号プレースホルダー 11">
             <a:extLst>
               <a:ext uri="{FF2B5EF4-FFF2-40B4-BE49-F238E27FC236}">
-                <a16:creationId xmlns:a16="http://schemas.microsoft.com/office/drawing/2014/main" id="{73202DF6-3030-4402-81A6-AB89E3FD874E}"/>
+                <a16:creationId xmlns:a16="http://schemas.microsoft.com/office/drawing/2014/main" id="{D800B612-0AB4-4FF1-9E66-59158BD76B88}"/>
               </a:ext>
             </a:extLst>
           </p:cNvPr>
@@ -18523,10 +18530,10 @@
       </p:sp>
       <p:sp>
         <p:nvSpPr>
-          <p:cNvPr id="15" name="スライド番号プレースホルダー 14">
+          <p:cNvPr id="9" name="スライド番号プレースホルダー 8">
             <a:extLst>
               <a:ext uri="{FF2B5EF4-FFF2-40B4-BE49-F238E27FC236}">
-                <a16:creationId xmlns:a16="http://schemas.microsoft.com/office/drawing/2014/main" id="{DC53F42E-7566-4A39-BA9C-249CC4D475AE}"/>
+                <a16:creationId xmlns:a16="http://schemas.microsoft.com/office/drawing/2014/main" id="{B05E49C1-8D2E-4633-AA72-3FF39FF0E5D5}"/>
               </a:ext>
             </a:extLst>
           </p:cNvPr>
@@ -19102,10 +19109,10 @@
       </p:sp>
       <p:sp>
         <p:nvSpPr>
-          <p:cNvPr id="17" name="スライド番号プレースホルダー 16">
+          <p:cNvPr id="7" name="スライド番号プレースホルダー 6">
             <a:extLst>
               <a:ext uri="{FF2B5EF4-FFF2-40B4-BE49-F238E27FC236}">
-                <a16:creationId xmlns:a16="http://schemas.microsoft.com/office/drawing/2014/main" id="{13FF279E-1291-40F2-B226-1C5FC69FFF65}"/>
+                <a16:creationId xmlns:a16="http://schemas.microsoft.com/office/drawing/2014/main" id="{398CDAF4-7502-4013-9F72-BA1D07882088}"/>
               </a:ext>
             </a:extLst>
           </p:cNvPr>
@@ -19648,10 +19655,10 @@
       </p:sp>
       <p:sp>
         <p:nvSpPr>
-          <p:cNvPr id="14" name="スライド番号プレースホルダー 13">
+          <p:cNvPr id="8" name="スライド番号プレースホルダー 7">
             <a:extLst>
               <a:ext uri="{FF2B5EF4-FFF2-40B4-BE49-F238E27FC236}">
-                <a16:creationId xmlns:a16="http://schemas.microsoft.com/office/drawing/2014/main" id="{4FFF32DE-B535-4FD5-81C8-4CCBB6F9FB88}"/>
+                <a16:creationId xmlns:a16="http://schemas.microsoft.com/office/drawing/2014/main" id="{F2346687-7D69-4801-B018-5454A0FACA53}"/>
               </a:ext>
             </a:extLst>
           </p:cNvPr>
@@ -20174,10 +20181,10 @@
       </p:sp>
       <p:sp>
         <p:nvSpPr>
-          <p:cNvPr id="16" name="スライド番号プレースホルダー 15">
+          <p:cNvPr id="7" name="スライド番号プレースホルダー 6">
             <a:extLst>
               <a:ext uri="{FF2B5EF4-FFF2-40B4-BE49-F238E27FC236}">
-                <a16:creationId xmlns:a16="http://schemas.microsoft.com/office/drawing/2014/main" id="{42CA737E-AF5A-449A-A2A5-4DE3C5033812}"/>
+                <a16:creationId xmlns:a16="http://schemas.microsoft.com/office/drawing/2014/main" id="{17643B93-A53F-43B3-BE3C-4803A4F18B10}"/>
               </a:ext>
             </a:extLst>
           </p:cNvPr>
@@ -20707,10 +20714,10 @@
       </p:sp>
       <p:sp>
         <p:nvSpPr>
-          <p:cNvPr id="17" name="スライド番号プレースホルダー 16">
+          <p:cNvPr id="7" name="スライド番号プレースホルダー 6">
             <a:extLst>
               <a:ext uri="{FF2B5EF4-FFF2-40B4-BE49-F238E27FC236}">
-                <a16:creationId xmlns:a16="http://schemas.microsoft.com/office/drawing/2014/main" id="{34101893-6479-4BDC-BCB2-39A8AD2C5DAA}"/>
+                <a16:creationId xmlns:a16="http://schemas.microsoft.com/office/drawing/2014/main" id="{43DF1B20-289C-4CDD-9EBE-E9A9D293879D}"/>
               </a:ext>
             </a:extLst>
           </p:cNvPr>
@@ -21266,10 +21273,10 @@
       </p:sp>
       <p:sp>
         <p:nvSpPr>
-          <p:cNvPr id="16" name="スライド番号プレースホルダー 15">
+          <p:cNvPr id="11" name="スライド番号プレースホルダー 10">
             <a:extLst>
               <a:ext uri="{FF2B5EF4-FFF2-40B4-BE49-F238E27FC236}">
-                <a16:creationId xmlns:a16="http://schemas.microsoft.com/office/drawing/2014/main" id="{7F242797-48BF-4FEE-B11B-9AF7B34189AC}"/>
+                <a16:creationId xmlns:a16="http://schemas.microsoft.com/office/drawing/2014/main" id="{A0203AD9-C1B0-44ED-A6B3-37A871D8E87D}"/>
               </a:ext>
             </a:extLst>
           </p:cNvPr>
@@ -21814,10 +21821,10 @@
       </p:sp>
       <p:sp>
         <p:nvSpPr>
-          <p:cNvPr id="10" name="スライド番号プレースホルダー 9">
+          <p:cNvPr id="5" name="スライド番号プレースホルダー 4">
             <a:extLst>
               <a:ext uri="{FF2B5EF4-FFF2-40B4-BE49-F238E27FC236}">
-                <a16:creationId xmlns:a16="http://schemas.microsoft.com/office/drawing/2014/main" id="{8011DC10-DE5F-42F0-87EB-E80E02F26273}"/>
+                <a16:creationId xmlns:a16="http://schemas.microsoft.com/office/drawing/2014/main" id="{C59BC17B-2B3D-4D9D-A890-1755943C57BE}"/>
               </a:ext>
             </a:extLst>
           </p:cNvPr>
@@ -22367,10 +22374,10 @@
       </p:sp>
       <p:sp>
         <p:nvSpPr>
-          <p:cNvPr id="16" name="スライド番号プレースホルダー 15">
+          <p:cNvPr id="10" name="スライド番号プレースホルダー 9">
             <a:extLst>
               <a:ext uri="{FF2B5EF4-FFF2-40B4-BE49-F238E27FC236}">
-                <a16:creationId xmlns:a16="http://schemas.microsoft.com/office/drawing/2014/main" id="{9573DE84-8BD2-4F50-8BB9-08E3853B8D87}"/>
+                <a16:creationId xmlns:a16="http://schemas.microsoft.com/office/drawing/2014/main" id="{0B44D273-0CE7-40AC-8F30-EDC0BB82EC85}"/>
               </a:ext>
             </a:extLst>
           </p:cNvPr>
@@ -22911,10 +22918,10 @@
       </p:sp>
       <p:sp>
         <p:nvSpPr>
-          <p:cNvPr id="15" name="スライド番号プレースホルダー 14">
+          <p:cNvPr id="9" name="スライド番号プレースホルダー 8">
             <a:extLst>
               <a:ext uri="{FF2B5EF4-FFF2-40B4-BE49-F238E27FC236}">
-                <a16:creationId xmlns:a16="http://schemas.microsoft.com/office/drawing/2014/main" id="{A52AE3C0-FE88-4543-81AF-3F257571C6F6}"/>
+                <a16:creationId xmlns:a16="http://schemas.microsoft.com/office/drawing/2014/main" id="{001738E5-7984-41F3-8298-306583D7980A}"/>
               </a:ext>
             </a:extLst>
           </p:cNvPr>
@@ -23472,10 +23479,10 @@
       </p:sp>
       <p:sp>
         <p:nvSpPr>
-          <p:cNvPr id="17" name="スライド番号プレースホルダー 16">
+          <p:cNvPr id="7" name="スライド番号プレースホルダー 6">
             <a:extLst>
               <a:ext uri="{FF2B5EF4-FFF2-40B4-BE49-F238E27FC236}">
-                <a16:creationId xmlns:a16="http://schemas.microsoft.com/office/drawing/2014/main" id="{D9DA7D43-0B37-48FB-AC06-8844BDA8A275}"/>
+                <a16:creationId xmlns:a16="http://schemas.microsoft.com/office/drawing/2014/main" id="{69849C8F-EE03-4B83-9F1D-F7D62B4F1C79}"/>
               </a:ext>
             </a:extLst>
           </p:cNvPr>
@@ -24010,10 +24017,10 @@
       </p:sp>
       <p:sp>
         <p:nvSpPr>
-          <p:cNvPr id="16" name="スライド番号プレースホルダー 15">
+          <p:cNvPr id="11" name="スライド番号プレースホルダー 10">
             <a:extLst>
               <a:ext uri="{FF2B5EF4-FFF2-40B4-BE49-F238E27FC236}">
-                <a16:creationId xmlns:a16="http://schemas.microsoft.com/office/drawing/2014/main" id="{CCEAEC39-3E82-403F-923A-F1B648DE80B4}"/>
+                <a16:creationId xmlns:a16="http://schemas.microsoft.com/office/drawing/2014/main" id="{8083606A-7F04-48C3-83FB-26F9094B3E79}"/>
               </a:ext>
             </a:extLst>
           </p:cNvPr>
@@ -24571,10 +24578,10 @@
       </p:sp>
       <p:sp>
         <p:nvSpPr>
-          <p:cNvPr id="17" name="スライド番号プレースホルダー 16">
+          <p:cNvPr id="7" name="スライド番号プレースホルダー 6">
             <a:extLst>
               <a:ext uri="{FF2B5EF4-FFF2-40B4-BE49-F238E27FC236}">
-                <a16:creationId xmlns:a16="http://schemas.microsoft.com/office/drawing/2014/main" id="{6D167279-30B9-4AC9-8C76-0A9366AE1B07}"/>
+                <a16:creationId xmlns:a16="http://schemas.microsoft.com/office/drawing/2014/main" id="{82EE1A66-E341-42B2-8DD4-5CA04DCC2044}"/>
               </a:ext>
             </a:extLst>
           </p:cNvPr>
@@ -25142,10 +25149,10 @@
       </p:sp>
       <p:sp>
         <p:nvSpPr>
-          <p:cNvPr id="17" name="スライド番号プレースホルダー 16">
+          <p:cNvPr id="7" name="スライド番号プレースホルダー 6">
             <a:extLst>
               <a:ext uri="{FF2B5EF4-FFF2-40B4-BE49-F238E27FC236}">
-                <a16:creationId xmlns:a16="http://schemas.microsoft.com/office/drawing/2014/main" id="{3F0C2BC1-D467-4892-A9AE-5C9354862C7F}"/>
+                <a16:creationId xmlns:a16="http://schemas.microsoft.com/office/drawing/2014/main" id="{A3B669C1-25D3-42DB-ADB5-20736391E270}"/>
               </a:ext>
             </a:extLst>
           </p:cNvPr>
@@ -25698,10 +25705,10 @@
       </p:sp>
       <p:sp>
         <p:nvSpPr>
-          <p:cNvPr id="15" name="スライド番号プレースホルダー 14">
+          <p:cNvPr id="7" name="スライド番号プレースホルダー 6">
             <a:extLst>
               <a:ext uri="{FF2B5EF4-FFF2-40B4-BE49-F238E27FC236}">
-                <a16:creationId xmlns:a16="http://schemas.microsoft.com/office/drawing/2014/main" id="{C2030114-2A59-43F0-820A-0E739AD82363}"/>
+                <a16:creationId xmlns:a16="http://schemas.microsoft.com/office/drawing/2014/main" id="{6D19A1C5-2B79-42ED-90C2-7EC84F703597}"/>
               </a:ext>
             </a:extLst>
           </p:cNvPr>
@@ -26478,10 +26485,10 @@
       </p:sp>
       <p:sp>
         <p:nvSpPr>
-          <p:cNvPr id="16" name="スライド番号プレースホルダー 15">
+          <p:cNvPr id="7" name="スライド番号プレースホルダー 6">
             <a:extLst>
               <a:ext uri="{FF2B5EF4-FFF2-40B4-BE49-F238E27FC236}">
-                <a16:creationId xmlns:a16="http://schemas.microsoft.com/office/drawing/2014/main" id="{6507F1F9-8D85-454D-9851-BE878846B44B}"/>
+                <a16:creationId xmlns:a16="http://schemas.microsoft.com/office/drawing/2014/main" id="{52F511E2-AA80-4567-885C-FA508D132803}"/>
               </a:ext>
             </a:extLst>
           </p:cNvPr>
@@ -27053,10 +27060,10 @@
       </p:sp>
       <p:sp>
         <p:nvSpPr>
-          <p:cNvPr id="16" name="スライド番号プレースホルダー 15">
+          <p:cNvPr id="10" name="スライド番号プレースホルダー 9">
             <a:extLst>
               <a:ext uri="{FF2B5EF4-FFF2-40B4-BE49-F238E27FC236}">
-                <a16:creationId xmlns:a16="http://schemas.microsoft.com/office/drawing/2014/main" id="{C7A03D08-6014-4B97-89E1-9DE723688EC8}"/>
+                <a16:creationId xmlns:a16="http://schemas.microsoft.com/office/drawing/2014/main" id="{23D52D7F-1BE0-4E86-B96F-2D28E4510F65}"/>
               </a:ext>
             </a:extLst>
           </p:cNvPr>
@@ -27616,10 +27623,10 @@
       </p:sp>
       <p:sp>
         <p:nvSpPr>
-          <p:cNvPr id="17" name="スライド番号プレースホルダー 16">
+          <p:cNvPr id="7" name="スライド番号プレースホルダー 6">
             <a:extLst>
               <a:ext uri="{FF2B5EF4-FFF2-40B4-BE49-F238E27FC236}">
-                <a16:creationId xmlns:a16="http://schemas.microsoft.com/office/drawing/2014/main" id="{64E7F7CA-C109-49C4-BBC3-B306DA9BCF0E}"/>
+                <a16:creationId xmlns:a16="http://schemas.microsoft.com/office/drawing/2014/main" id="{2B1F3538-EDE6-4B57-8EE1-6A6C0C893261}"/>
               </a:ext>
             </a:extLst>
           </p:cNvPr>
@@ -28240,10 +28247,10 @@
       </p:sp>
       <p:sp>
         <p:nvSpPr>
-          <p:cNvPr id="17" name="スライド番号プレースホルダー 16">
+          <p:cNvPr id="8" name="スライド番号プレースホルダー 7">
             <a:extLst>
               <a:ext uri="{FF2B5EF4-FFF2-40B4-BE49-F238E27FC236}">
-                <a16:creationId xmlns:a16="http://schemas.microsoft.com/office/drawing/2014/main" id="{A44D0713-BE3C-44D8-A595-8284CBDA8FE7}"/>
+                <a16:creationId xmlns:a16="http://schemas.microsoft.com/office/drawing/2014/main" id="{F327C284-F010-4161-8D8D-73308DD7EBA7}"/>
               </a:ext>
             </a:extLst>
           </p:cNvPr>
@@ -28765,10 +28772,10 @@
       </p:sp>
       <p:sp>
         <p:nvSpPr>
-          <p:cNvPr id="17" name="スライド番号プレースホルダー 16">
+          <p:cNvPr id="7" name="スライド番号プレースホルダー 6">
             <a:extLst>
               <a:ext uri="{FF2B5EF4-FFF2-40B4-BE49-F238E27FC236}">
-                <a16:creationId xmlns:a16="http://schemas.microsoft.com/office/drawing/2014/main" id="{0196633A-12CF-41B9-B3E8-C93CDB8CFAE2}"/>
+                <a16:creationId xmlns:a16="http://schemas.microsoft.com/office/drawing/2014/main" id="{61B9DCBA-C955-48F7-8528-0FCE4658C476}"/>
               </a:ext>
             </a:extLst>
           </p:cNvPr>
@@ -29362,10 +29369,10 @@
       </p:sp>
       <p:sp>
         <p:nvSpPr>
-          <p:cNvPr id="17" name="スライド番号プレースホルダー 16">
+          <p:cNvPr id="7" name="スライド番号プレースホルダー 6">
             <a:extLst>
               <a:ext uri="{FF2B5EF4-FFF2-40B4-BE49-F238E27FC236}">
-                <a16:creationId xmlns:a16="http://schemas.microsoft.com/office/drawing/2014/main" id="{B064E039-6982-4C73-96EB-365B63FCF300}"/>
+                <a16:creationId xmlns:a16="http://schemas.microsoft.com/office/drawing/2014/main" id="{412A2C86-5ED0-40FE-B301-0F595087F851}"/>
               </a:ext>
             </a:extLst>
           </p:cNvPr>
@@ -29901,10 +29908,10 @@
       </p:sp>
       <p:sp>
         <p:nvSpPr>
-          <p:cNvPr id="17" name="スライド番号プレースホルダー 16">
+          <p:cNvPr id="7" name="スライド番号プレースホルダー 6">
             <a:extLst>
               <a:ext uri="{FF2B5EF4-FFF2-40B4-BE49-F238E27FC236}">
-                <a16:creationId xmlns:a16="http://schemas.microsoft.com/office/drawing/2014/main" id="{573BE4C2-1120-4DF0-8101-2CFAA27D7E47}"/>
+                <a16:creationId xmlns:a16="http://schemas.microsoft.com/office/drawing/2014/main" id="{5606D919-EB94-4D9A-8E12-D6AAC7E59865}"/>
               </a:ext>
             </a:extLst>
           </p:cNvPr>
@@ -30410,10 +30417,10 @@
       </p:sp>
       <p:sp>
         <p:nvSpPr>
-          <p:cNvPr id="16" name="スライド番号プレースホルダー 15">
+          <p:cNvPr id="7" name="スライド番号プレースホルダー 6">
             <a:extLst>
               <a:ext uri="{FF2B5EF4-FFF2-40B4-BE49-F238E27FC236}">
-                <a16:creationId xmlns:a16="http://schemas.microsoft.com/office/drawing/2014/main" id="{F23C5DBF-1167-4119-9FF6-358FB61DE79A}"/>
+                <a16:creationId xmlns:a16="http://schemas.microsoft.com/office/drawing/2014/main" id="{D2391002-1ACD-437D-B10B-B94E96E9CA1F}"/>
               </a:ext>
             </a:extLst>
           </p:cNvPr>
@@ -31040,10 +31047,10 @@
       </p:sp>
       <p:sp>
         <p:nvSpPr>
-          <p:cNvPr id="16" name="スライド番号プレースホルダー 15">
+          <p:cNvPr id="7" name="スライド番号プレースホルダー 6">
             <a:extLst>
               <a:ext uri="{FF2B5EF4-FFF2-40B4-BE49-F238E27FC236}">
-                <a16:creationId xmlns:a16="http://schemas.microsoft.com/office/drawing/2014/main" id="{6F371EF0-FEA9-4D3F-84E2-298F77F26C72}"/>
+                <a16:creationId xmlns:a16="http://schemas.microsoft.com/office/drawing/2014/main" id="{A546ED3D-E4A1-4E4A-86B7-49D6E82627B1}"/>
               </a:ext>
             </a:extLst>
           </p:cNvPr>
@@ -31632,10 +31639,10 @@
       </p:sp>
       <p:sp>
         <p:nvSpPr>
-          <p:cNvPr id="16" name="スライド番号プレースホルダー 15">
+          <p:cNvPr id="7" name="スライド番号プレースホルダー 6">
             <a:extLst>
               <a:ext uri="{FF2B5EF4-FFF2-40B4-BE49-F238E27FC236}">
-                <a16:creationId xmlns:a16="http://schemas.microsoft.com/office/drawing/2014/main" id="{CE9E96A5-618F-41E2-B000-503E0AC07A7D}"/>
+                <a16:creationId xmlns:a16="http://schemas.microsoft.com/office/drawing/2014/main" id="{BA0B9E80-76D1-413C-8583-A6A69D847EE2}"/>
               </a:ext>
             </a:extLst>
           </p:cNvPr>
@@ -32243,10 +32250,10 @@
       </p:sp>
       <p:sp>
         <p:nvSpPr>
-          <p:cNvPr id="17" name="スライド番号プレースホルダー 16">
+          <p:cNvPr id="8" name="スライド番号プレースホルダー 7">
             <a:extLst>
               <a:ext uri="{FF2B5EF4-FFF2-40B4-BE49-F238E27FC236}">
-                <a16:creationId xmlns:a16="http://schemas.microsoft.com/office/drawing/2014/main" id="{8CC1D676-7414-4E1E-B574-DA4F242600F5}"/>
+                <a16:creationId xmlns:a16="http://schemas.microsoft.com/office/drawing/2014/main" id="{D9E80A0D-C934-4C95-8A05-EF987CCEF121}"/>
               </a:ext>
             </a:extLst>
           </p:cNvPr>
@@ -32798,10 +32805,10 @@
       </p:sp>
       <p:sp>
         <p:nvSpPr>
-          <p:cNvPr id="17" name="スライド番号プレースホルダー 16">
+          <p:cNvPr id="7" name="スライド番号プレースホルダー 6">
             <a:extLst>
               <a:ext uri="{FF2B5EF4-FFF2-40B4-BE49-F238E27FC236}">
-                <a16:creationId xmlns:a16="http://schemas.microsoft.com/office/drawing/2014/main" id="{72B5F1D0-E07F-4CF1-8A62-1878C536B4CA}"/>
+                <a16:creationId xmlns:a16="http://schemas.microsoft.com/office/drawing/2014/main" id="{C9DA36E3-C334-4C7E-9ED4-FB418E1E1421}"/>
               </a:ext>
             </a:extLst>
           </p:cNvPr>
@@ -33332,10 +33339,10 @@
       </p:sp>
       <p:sp>
         <p:nvSpPr>
-          <p:cNvPr id="17" name="スライド番号プレースホルダー 16">
+          <p:cNvPr id="7" name="スライド番号プレースホルダー 6">
             <a:extLst>
               <a:ext uri="{FF2B5EF4-FFF2-40B4-BE49-F238E27FC236}">
-                <a16:creationId xmlns:a16="http://schemas.microsoft.com/office/drawing/2014/main" id="{579A32F9-A436-4D1B-8FDA-626FF229FCFC}"/>
+                <a16:creationId xmlns:a16="http://schemas.microsoft.com/office/drawing/2014/main" id="{5A1E1FD0-6CB6-40D4-82AB-AE51D72AA008}"/>
               </a:ext>
             </a:extLst>
           </p:cNvPr>
@@ -33877,10 +33884,10 @@
       </p:sp>
       <p:sp>
         <p:nvSpPr>
-          <p:cNvPr id="17" name="スライド番号プレースホルダー 16">
+          <p:cNvPr id="7" name="スライド番号プレースホルダー 6">
             <a:extLst>
               <a:ext uri="{FF2B5EF4-FFF2-40B4-BE49-F238E27FC236}">
-                <a16:creationId xmlns:a16="http://schemas.microsoft.com/office/drawing/2014/main" id="{BCF644C7-20B6-433A-8B4C-CA7FCB717765}"/>
+                <a16:creationId xmlns:a16="http://schemas.microsoft.com/office/drawing/2014/main" id="{24381094-8961-4979-81F1-2A77E949EB61}"/>
               </a:ext>
             </a:extLst>
           </p:cNvPr>
@@ -34565,10 +34572,10 @@
       </p:sp>
       <p:sp>
         <p:nvSpPr>
-          <p:cNvPr id="16" name="スライド番号プレースホルダー 15">
+          <p:cNvPr id="12" name="スライド番号プレースホルダー 11">
             <a:extLst>
               <a:ext uri="{FF2B5EF4-FFF2-40B4-BE49-F238E27FC236}">
-                <a16:creationId xmlns:a16="http://schemas.microsoft.com/office/drawing/2014/main" id="{CD81BB4D-8CAE-4116-AFFF-EB2C5B0F80A9}"/>
+                <a16:creationId xmlns:a16="http://schemas.microsoft.com/office/drawing/2014/main" id="{ECC8AC88-0280-48A4-AA32-04677A7D5739}"/>
               </a:ext>
             </a:extLst>
           </p:cNvPr>
@@ -35177,10 +35184,10 @@
       </p:sp>
       <p:sp>
         <p:nvSpPr>
-          <p:cNvPr id="18" name="スライド番号プレースホルダー 17">
+          <p:cNvPr id="8" name="スライド番号プレースホルダー 7">
             <a:extLst>
               <a:ext uri="{FF2B5EF4-FFF2-40B4-BE49-F238E27FC236}">
-                <a16:creationId xmlns:a16="http://schemas.microsoft.com/office/drawing/2014/main" id="{12964427-51B7-40A0-86ED-477FA2727EC5}"/>
+                <a16:creationId xmlns:a16="http://schemas.microsoft.com/office/drawing/2014/main" id="{C3D96601-6F93-49FA-825E-27314B9F3B90}"/>
               </a:ext>
             </a:extLst>
           </p:cNvPr>
@@ -35812,10 +35819,10 @@
       </p:sp>
       <p:sp>
         <p:nvSpPr>
-          <p:cNvPr id="16" name="スライド番号プレースホルダー 15">
+          <p:cNvPr id="7" name="スライド番号プレースホルダー 6">
             <a:extLst>
               <a:ext uri="{FF2B5EF4-FFF2-40B4-BE49-F238E27FC236}">
-                <a16:creationId xmlns:a16="http://schemas.microsoft.com/office/drawing/2014/main" id="{E5683E17-064A-4823-8BB6-3CBC609F91AF}"/>
+                <a16:creationId xmlns:a16="http://schemas.microsoft.com/office/drawing/2014/main" id="{28BA4381-190D-4BAE-AF60-A2BD088038B8}"/>
               </a:ext>
             </a:extLst>
           </p:cNvPr>
@@ -36393,10 +36400,10 @@
       </p:sp>
       <p:sp>
         <p:nvSpPr>
-          <p:cNvPr id="16" name="スライド番号プレースホルダー 15">
+          <p:cNvPr id="7" name="スライド番号プレースホルダー 6">
             <a:extLst>
               <a:ext uri="{FF2B5EF4-FFF2-40B4-BE49-F238E27FC236}">
-                <a16:creationId xmlns:a16="http://schemas.microsoft.com/office/drawing/2014/main" id="{48514726-CD71-4044-ADA7-01218A2C08D3}"/>
+                <a16:creationId xmlns:a16="http://schemas.microsoft.com/office/drawing/2014/main" id="{D94B3B27-52A9-4FBF-B582-A89693B76CE1}"/>
               </a:ext>
             </a:extLst>
           </p:cNvPr>
@@ -36937,10 +36944,10 @@
       </p:sp>
       <p:sp>
         <p:nvSpPr>
-          <p:cNvPr id="16" name="スライド番号プレースホルダー 15">
+          <p:cNvPr id="7" name="スライド番号プレースホルダー 6">
             <a:extLst>
               <a:ext uri="{FF2B5EF4-FFF2-40B4-BE49-F238E27FC236}">
-                <a16:creationId xmlns:a16="http://schemas.microsoft.com/office/drawing/2014/main" id="{E64B76E4-6468-441B-8165-080585C2B0AE}"/>
+                <a16:creationId xmlns:a16="http://schemas.microsoft.com/office/drawing/2014/main" id="{E2957FFD-83E8-43EB-BB64-5565A4928D6E}"/>
               </a:ext>
             </a:extLst>
           </p:cNvPr>
@@ -37469,10 +37476,10 @@
       </p:sp>
       <p:sp>
         <p:nvSpPr>
-          <p:cNvPr id="17" name="スライド番号プレースホルダー 16">
+          <p:cNvPr id="7" name="スライド番号プレースホルダー 6">
             <a:extLst>
               <a:ext uri="{FF2B5EF4-FFF2-40B4-BE49-F238E27FC236}">
-                <a16:creationId xmlns:a16="http://schemas.microsoft.com/office/drawing/2014/main" id="{135B5B3C-3D85-474F-9695-B44D294E2A05}"/>
+                <a16:creationId xmlns:a16="http://schemas.microsoft.com/office/drawing/2014/main" id="{0B2AF0AC-5260-4FDF-878E-E935F09FAE9A}"/>
               </a:ext>
             </a:extLst>
           </p:cNvPr>
@@ -38066,10 +38073,10 @@
       </p:sp>
       <p:sp>
         <p:nvSpPr>
-          <p:cNvPr id="17" name="スライド番号プレースホルダー 16">
+          <p:cNvPr id="7" name="スライド番号プレースホルダー 6">
             <a:extLst>
               <a:ext uri="{FF2B5EF4-FFF2-40B4-BE49-F238E27FC236}">
-                <a16:creationId xmlns:a16="http://schemas.microsoft.com/office/drawing/2014/main" id="{3586F4AD-727D-4CFD-84B5-743A95D36FD2}"/>
+                <a16:creationId xmlns:a16="http://schemas.microsoft.com/office/drawing/2014/main" id="{FF7B357F-4795-4435-A7A6-77010FA284DA}"/>
               </a:ext>
             </a:extLst>
           </p:cNvPr>
@@ -38370,10 +38377,10 @@
       </p:sp>
       <p:sp>
         <p:nvSpPr>
-          <p:cNvPr id="11" name="スライド番号プレースホルダー 10">
+          <p:cNvPr id="6" name="スライド番号プレースホルダー 5">
             <a:extLst>
               <a:ext uri="{FF2B5EF4-FFF2-40B4-BE49-F238E27FC236}">
-                <a16:creationId xmlns:a16="http://schemas.microsoft.com/office/drawing/2014/main" id="{B051581A-38E9-40DC-BFFF-63FE1EC0D289}"/>
+                <a16:creationId xmlns:a16="http://schemas.microsoft.com/office/drawing/2014/main" id="{9D4B34D2-A5A4-41BF-9838-54B6C64A5E31}"/>
               </a:ext>
             </a:extLst>
           </p:cNvPr>
@@ -39220,10 +39227,10 @@
       </p:sp>
       <p:sp>
         <p:nvSpPr>
-          <p:cNvPr id="17" name="スライド番号プレースホルダー 16">
+          <p:cNvPr id="13" name="スライド番号プレースホルダー 12">
             <a:extLst>
               <a:ext uri="{FF2B5EF4-FFF2-40B4-BE49-F238E27FC236}">
-                <a16:creationId xmlns:a16="http://schemas.microsoft.com/office/drawing/2014/main" id="{2286A75D-D9BA-4355-9449-4A6495F78FF0}"/>
+                <a16:creationId xmlns:a16="http://schemas.microsoft.com/office/drawing/2014/main" id="{EA59AB87-95E6-42A8-9681-12C262506390}"/>
               </a:ext>
             </a:extLst>
           </p:cNvPr>
@@ -39829,10 +39836,10 @@
       </p:sp>
       <p:sp>
         <p:nvSpPr>
-          <p:cNvPr id="17" name="スライド番号プレースホルダー 16">
+          <p:cNvPr id="7" name="スライド番号プレースホルダー 6">
             <a:extLst>
               <a:ext uri="{FF2B5EF4-FFF2-40B4-BE49-F238E27FC236}">
-                <a16:creationId xmlns:a16="http://schemas.microsoft.com/office/drawing/2014/main" id="{6F97D1DE-F41C-4694-8C32-D7A963C9151E}"/>
+                <a16:creationId xmlns:a16="http://schemas.microsoft.com/office/drawing/2014/main" id="{56BA3ECA-5960-4A06-9783-C10F4FA417E3}"/>
               </a:ext>
             </a:extLst>
           </p:cNvPr>
@@ -40399,10 +40406,10 @@
       </p:sp>
       <p:sp>
         <p:nvSpPr>
-          <p:cNvPr id="16" name="スライド番号プレースホルダー 15">
+          <p:cNvPr id="12" name="スライド番号プレースホルダー 11">
             <a:extLst>
               <a:ext uri="{FF2B5EF4-FFF2-40B4-BE49-F238E27FC236}">
-                <a16:creationId xmlns:a16="http://schemas.microsoft.com/office/drawing/2014/main" id="{E258DA61-8D7F-4A06-9B62-22547E5416DE}"/>
+                <a16:creationId xmlns:a16="http://schemas.microsoft.com/office/drawing/2014/main" id="{A4D52D80-B4C0-488F-B586-446475EE3142}"/>
               </a:ext>
             </a:extLst>
           </p:cNvPr>
@@ -40983,10 +40990,10 @@
       </p:sp>
       <p:sp>
         <p:nvSpPr>
-          <p:cNvPr id="17" name="スライド番号プレースホルダー 16">
+          <p:cNvPr id="7" name="スライド番号プレースホルダー 6">
             <a:extLst>
               <a:ext uri="{FF2B5EF4-FFF2-40B4-BE49-F238E27FC236}">
-                <a16:creationId xmlns:a16="http://schemas.microsoft.com/office/drawing/2014/main" id="{37877E4F-CF0E-4DA8-A5C3-BDC2BCC8A69E}"/>
+                <a16:creationId xmlns:a16="http://schemas.microsoft.com/office/drawing/2014/main" id="{50FD1833-0EF8-4408-833F-C4DE759E9D59}"/>
               </a:ext>
             </a:extLst>
           </p:cNvPr>

</xml_diff>

<commit_message>
Added and corrected notes on the cover page.
Added and corrected notes on the cover page of the "Frequent Misunderstandings of OSS licenses V7".

"Frequent Misunderstandings of OSS licenses V7"の表紙の注記を追加、修正しました。
</commit_message>
<xml_diff>
--- a/Education_Material/FAQ/Misunderstandings_of_OSS_licenses_CC0.pptx
+++ b/Education_Material/FAQ/Misunderstandings_of_OSS_licenses_CC0.pptx
@@ -293,7 +293,7 @@
           <a:p>
             <a:fld id="{7EE8F3AE-FD72-4533-A5FB-266F0DC61623}" type="datetimeFigureOut">
               <a:rPr kumimoji="1" lang="ja-JP" altLang="en-US" smtClean="0"/>
-              <a:t>2022/1/6</a:t>
+              <a:t>2022/1/12</a:t>
             </a:fld>
             <a:endParaRPr kumimoji="1" lang="ja-JP" altLang="en-US"/>
           </a:p>
@@ -466,7 +466,7 @@
           <a:p>
             <a:fld id="{F0F040E9-6AB7-471E-8A6F-82F6EB81B1F8}" type="datetimeFigureOut">
               <a:rPr kumimoji="1" lang="ja-JP" altLang="en-US" smtClean="0"/>
-              <a:t>2022/1/6</a:t>
+              <a:t>2022/1/12</a:t>
             </a:fld>
             <a:endParaRPr kumimoji="1" lang="ja-JP" altLang="en-US"/>
           </a:p>
@@ -7106,7 +7106,7 @@
           <a:p>
             <a:fld id="{8CA85632-6543-417D-AA37-747D5FCD144A}" type="datetime1">
               <a:rPr kumimoji="1" lang="ja-JP" altLang="en-US" smtClean="0"/>
-              <a:t>2022/1/6</a:t>
+              <a:t>2022/1/12</a:t>
             </a:fld>
             <a:endParaRPr kumimoji="1" lang="ja-JP" altLang="en-US"/>
           </a:p>
@@ -7310,7 +7310,7 @@
           <a:p>
             <a:fld id="{B06565E3-0D02-4356-A8E4-34212A8E714C}" type="datetime1">
               <a:rPr kumimoji="1" lang="ja-JP" altLang="en-US" smtClean="0"/>
-              <a:t>2022/1/6</a:t>
+              <a:t>2022/1/12</a:t>
             </a:fld>
             <a:endParaRPr kumimoji="1" lang="ja-JP" altLang="en-US"/>
           </a:p>
@@ -7663,7 +7663,7 @@
           <a:p>
             <a:fld id="{D1AE0380-F014-4923-9788-A7EEF4DBE4AF}" type="datetime1">
               <a:rPr kumimoji="1" lang="ja-JP" altLang="en-US" smtClean="0"/>
-              <a:t>2022/1/6</a:t>
+              <a:t>2022/1/12</a:t>
             </a:fld>
             <a:endParaRPr kumimoji="1" lang="ja-JP" altLang="en-US"/>
           </a:p>
@@ -7784,7 +7784,7 @@
           <a:p>
             <a:fld id="{E820F06B-049D-4BD4-9820-27A6981014E2}" type="datetime1">
               <a:rPr kumimoji="1" lang="ja-JP" altLang="en-US" smtClean="0"/>
-              <a:t>2022/1/6</a:t>
+              <a:t>2022/1/12</a:t>
             </a:fld>
             <a:endParaRPr kumimoji="1" lang="ja-JP" altLang="en-US"/>
           </a:p>
@@ -7883,7 +7883,7 @@
           <a:p>
             <a:fld id="{63B99404-B2ED-46D2-9FEA-10E2217461D3}" type="datetime1">
               <a:rPr kumimoji="1" lang="ja-JP" altLang="en-US" smtClean="0"/>
-              <a:t>2022/1/6</a:t>
+              <a:t>2022/1/12</a:t>
             </a:fld>
             <a:endParaRPr kumimoji="1" lang="ja-JP" altLang="en-US"/>
           </a:p>
@@ -8130,7 +8130,7 @@
           <a:p>
             <a:fld id="{F8226610-8A1B-469C-9F96-3C27427A06DB}" type="datetime1">
               <a:rPr kumimoji="1" lang="ja-JP" altLang="en-US" smtClean="0"/>
-              <a:t>2022/1/6</a:t>
+              <a:t>2022/1/12</a:t>
             </a:fld>
             <a:endParaRPr kumimoji="1" lang="ja-JP" altLang="en-US"/>
           </a:p>
@@ -8585,7 +8585,7 @@
               <a:t> </a:t>
             </a:r>
             <a:r>
-              <a:rPr lang="en-US" altLang="ja-JP" sz="4000" dirty="0">
+              <a:rPr lang="en-US" altLang="ja-JP" sz="4000">
                 <a:latin typeface="Meiryo UI" panose="020B0604030504040204" pitchFamily="50" charset="-128"/>
                 <a:ea typeface="Meiryo UI" panose="020B0604030504040204" pitchFamily="50" charset="-128"/>
                 <a:cs typeface="Meiryo UI" panose="020B0604030504040204" pitchFamily="50" charset="-128"/>
@@ -8611,8 +8611,8 @@
         </p:nvSpPr>
         <p:spPr>
           <a:xfrm>
-            <a:off x="899592" y="3645024"/>
-            <a:ext cx="7344816" cy="2351112"/>
+            <a:off x="899592" y="3114493"/>
+            <a:ext cx="7344816" cy="3241857"/>
           </a:xfrm>
           <a:noFill/>
           <a:ln>
@@ -8763,7 +8763,50 @@
                 <a:ea typeface="Meiryo UI" panose="020B0604030504040204" pitchFamily="50" charset="-128"/>
                 <a:cs typeface="Meiryo UI" panose="020B0604030504040204" pitchFamily="50" charset="-128"/>
               </a:rPr>
-              <a:t>for this document can be used under the </a:t>
+              <a:t>for </a:t>
+            </a:r>
+            <a:r>
+              <a:rPr lang="ja-JP" altLang="en-US" sz="2200" dirty="0">
+                <a:solidFill>
+                  <a:schemeClr val="tx1"/>
+                </a:solidFill>
+                <a:latin typeface="Meiryo UI" panose="020B0604030504040204" pitchFamily="50" charset="-128"/>
+                <a:ea typeface="Meiryo UI" panose="020B0604030504040204" pitchFamily="50" charset="-128"/>
+                <a:cs typeface="Meiryo UI" panose="020B0604030504040204" pitchFamily="50" charset="-128"/>
+              </a:rPr>
+              <a:t>　</a:t>
+            </a:r>
+            <a:br>
+              <a:rPr lang="en-US" altLang="ja-JP" sz="2200" dirty="0">
+                <a:solidFill>
+                  <a:schemeClr val="tx1"/>
+                </a:solidFill>
+                <a:latin typeface="Meiryo UI" panose="020B0604030504040204" pitchFamily="50" charset="-128"/>
+                <a:ea typeface="Meiryo UI" panose="020B0604030504040204" pitchFamily="50" charset="-128"/>
+                <a:cs typeface="Meiryo UI" panose="020B0604030504040204" pitchFamily="50" charset="-128"/>
+              </a:rPr>
+            </a:br>
+            <a:r>
+              <a:rPr lang="ja-JP" altLang="en-US" sz="2200" dirty="0">
+                <a:solidFill>
+                  <a:schemeClr val="tx1"/>
+                </a:solidFill>
+                <a:latin typeface="Meiryo UI" panose="020B0604030504040204" pitchFamily="50" charset="-128"/>
+                <a:ea typeface="Meiryo UI" panose="020B0604030504040204" pitchFamily="50" charset="-128"/>
+                <a:cs typeface="Meiryo UI" panose="020B0604030504040204" pitchFamily="50" charset="-128"/>
+              </a:rPr>
+              <a:t>　 </a:t>
+            </a:r>
+            <a:r>
+              <a:rPr lang="en-US" altLang="ja-JP" sz="2200" dirty="0">
+                <a:solidFill>
+                  <a:schemeClr val="tx1"/>
+                </a:solidFill>
+                <a:latin typeface="Meiryo UI" panose="020B0604030504040204" pitchFamily="50" charset="-128"/>
+                <a:ea typeface="Meiryo UI" panose="020B0604030504040204" pitchFamily="50" charset="-128"/>
+                <a:cs typeface="Meiryo UI" panose="020B0604030504040204" pitchFamily="50" charset="-128"/>
+              </a:rPr>
+              <a:t>this document can be used under the </a:t>
             </a:r>
             <a:r>
               <a:rPr lang="en-US" altLang="ja-JP" sz="2400" dirty="0">
@@ -8796,7 +8839,7 @@
               </a:lnSpc>
             </a:pPr>
             <a:r>
-              <a:rPr lang="ja-JP" altLang="en-US" sz="2200" dirty="0">
+              <a:rPr lang="en-US" altLang="ja-JP" sz="2400" b="1" dirty="0">
                 <a:solidFill>
                   <a:schemeClr val="tx1"/>
                 </a:solidFill>
@@ -8804,10 +8847,10 @@
                 <a:ea typeface="Meiryo UI" panose="020B0604030504040204" pitchFamily="50" charset="-128"/>
                 <a:cs typeface="Meiryo UI" panose="020B0604030504040204" pitchFamily="50" charset="-128"/>
               </a:rPr>
-              <a:t>◆</a:t>
-            </a:r>
-            <a:r>
-              <a:rPr lang="en-US" altLang="ja-JP" sz="2200" dirty="0">
+              <a:t>◆This FAQ is based on Japanese law. Laws vary from country to country, and  </a:t>
+            </a:r>
+            <a:br>
+              <a:rPr lang="en-US" altLang="ja-JP" sz="2400" b="1" dirty="0">
                 <a:solidFill>
                   <a:schemeClr val="tx1"/>
                 </a:solidFill>
@@ -8815,8 +8858,75 @@
                 <a:ea typeface="Meiryo UI" panose="020B0604030504040204" pitchFamily="50" charset="-128"/>
                 <a:cs typeface="Meiryo UI" panose="020B0604030504040204" pitchFamily="50" charset="-128"/>
               </a:rPr>
-              <a:t>Please be advised that in no event shall the author and provider be liable with regard to the contents of this document. </a:t>
-            </a:r>
+            </a:br>
+            <a:r>
+              <a:rPr lang="en-US" altLang="ja-JP" sz="2400" b="1" dirty="0">
+                <a:solidFill>
+                  <a:schemeClr val="tx1"/>
+                </a:solidFill>
+                <a:latin typeface="Meiryo UI" panose="020B0604030504040204" pitchFamily="50" charset="-128"/>
+                <a:ea typeface="Meiryo UI" panose="020B0604030504040204" pitchFamily="50" charset="-128"/>
+                <a:cs typeface="Meiryo UI" panose="020B0604030504040204" pitchFamily="50" charset="-128"/>
+              </a:rPr>
+              <a:t>  measures for each case may vary from company to company. Consult your </a:t>
+            </a:r>
+            <a:br>
+              <a:rPr lang="en-US" altLang="ja-JP" sz="2400" b="1" dirty="0">
+                <a:solidFill>
+                  <a:schemeClr val="tx1"/>
+                </a:solidFill>
+                <a:latin typeface="Meiryo UI" panose="020B0604030504040204" pitchFamily="50" charset="-128"/>
+                <a:ea typeface="Meiryo UI" panose="020B0604030504040204" pitchFamily="50" charset="-128"/>
+                <a:cs typeface="Meiryo UI" panose="020B0604030504040204" pitchFamily="50" charset="-128"/>
+              </a:rPr>
+            </a:br>
+            <a:r>
+              <a:rPr lang="en-US" altLang="ja-JP" sz="2400" b="1" dirty="0">
+                <a:solidFill>
+                  <a:schemeClr val="tx1"/>
+                </a:solidFill>
+                <a:latin typeface="Meiryo UI" panose="020B0604030504040204" pitchFamily="50" charset="-128"/>
+                <a:ea typeface="Meiryo UI" panose="020B0604030504040204" pitchFamily="50" charset="-128"/>
+                <a:cs typeface="Meiryo UI" panose="020B0604030504040204" pitchFamily="50" charset="-128"/>
+              </a:rPr>
+              <a:t>  company or organization's intellectual property counsel for specific issues.</a:t>
+            </a:r>
+          </a:p>
+          <a:p>
+            <a:pPr algn="l">
+              <a:lnSpc>
+                <a:spcPct val="120000"/>
+              </a:lnSpc>
+            </a:pPr>
+            <a:r>
+              <a:rPr lang="en-US" altLang="ja-JP" sz="2400" b="1" dirty="0">
+                <a:solidFill>
+                  <a:schemeClr val="tx1"/>
+                </a:solidFill>
+                <a:latin typeface="Meiryo UI" panose="020B0604030504040204" pitchFamily="50" charset="-128"/>
+                <a:ea typeface="Meiryo UI" panose="020B0604030504040204" pitchFamily="50" charset="-128"/>
+                <a:cs typeface="Meiryo UI" panose="020B0604030504040204" pitchFamily="50" charset="-128"/>
+              </a:rPr>
+              <a:t>◆Authors and providers are not responsible for the contents of this manual.</a:t>
+            </a:r>
+            <a:br>
+              <a:rPr lang="en-US" altLang="ja-JP" sz="2200" b="1" dirty="0">
+                <a:solidFill>
+                  <a:schemeClr val="tx1"/>
+                </a:solidFill>
+                <a:latin typeface="Meiryo UI" panose="020B0604030504040204" pitchFamily="50" charset="-128"/>
+                <a:ea typeface="Meiryo UI" panose="020B0604030504040204" pitchFamily="50" charset="-128"/>
+                <a:cs typeface="Meiryo UI" panose="020B0604030504040204" pitchFamily="50" charset="-128"/>
+              </a:rPr>
+            </a:br>
+            <a:endParaRPr lang="en-US" altLang="ja-JP" sz="2200" b="1" dirty="0">
+              <a:solidFill>
+                <a:schemeClr val="tx1"/>
+              </a:solidFill>
+              <a:latin typeface="Meiryo UI" panose="020B0604030504040204" pitchFamily="50" charset="-128"/>
+              <a:ea typeface="Meiryo UI" panose="020B0604030504040204" pitchFamily="50" charset="-128"/>
+              <a:cs typeface="Meiryo UI" panose="020B0604030504040204" pitchFamily="50" charset="-128"/>
+            </a:endParaRPr>
           </a:p>
           <a:p>
             <a:pPr algn="l">
@@ -9009,7 +9119,7 @@
         <p:spPr>
           <a:xfrm>
             <a:off x="5992306" y="811752"/>
-            <a:ext cx="2584105" cy="369332"/>
+            <a:ext cx="2781274" cy="369332"/>
           </a:xfrm>
           <a:prstGeom prst="rect">
             <a:avLst/>
@@ -9024,7 +9134,7 @@
           <a:p>
             <a:r>
               <a:rPr kumimoji="1" lang="en-US" altLang="ja-JP" dirty="0"/>
-              <a:t>Updated: January 5, 2022</a:t>
+              <a:t>Updated: January 12, 2022</a:t>
             </a:r>
             <a:endParaRPr kumimoji="1" lang="ja-JP" altLang="en-US" dirty="0"/>
           </a:p>
@@ -9559,10 +9669,10 @@
       </p:sp>
       <p:sp>
         <p:nvSpPr>
-          <p:cNvPr id="7" name="スライド番号プレースホルダー 6">
+          <p:cNvPr id="17" name="スライド番号プレースホルダー 16">
             <a:extLst>
               <a:ext uri="{FF2B5EF4-FFF2-40B4-BE49-F238E27FC236}">
-                <a16:creationId xmlns:a16="http://schemas.microsoft.com/office/drawing/2014/main" id="{F63848E7-205A-4C95-888A-0E14EAA4B25C}"/>
+                <a16:creationId xmlns:a16="http://schemas.microsoft.com/office/drawing/2014/main" id="{8FBFE7F3-7E06-4D73-B616-5F8E47E3E556}"/>
               </a:ext>
             </a:extLst>
           </p:cNvPr>
@@ -10164,10 +10274,10 @@
       </p:sp>
       <p:sp>
         <p:nvSpPr>
-          <p:cNvPr id="12" name="スライド番号プレースホルダー 11">
+          <p:cNvPr id="17" name="スライド番号プレースホルダー 16">
             <a:extLst>
               <a:ext uri="{FF2B5EF4-FFF2-40B4-BE49-F238E27FC236}">
-                <a16:creationId xmlns:a16="http://schemas.microsoft.com/office/drawing/2014/main" id="{9A8A51DF-97B5-4F6B-9F1F-4AF0DDB035FF}"/>
+                <a16:creationId xmlns:a16="http://schemas.microsoft.com/office/drawing/2014/main" id="{DD06363C-A27F-4343-AB34-BD96C0202564}"/>
               </a:ext>
             </a:extLst>
           </p:cNvPr>
@@ -10769,10 +10879,10 @@
       </p:sp>
       <p:sp>
         <p:nvSpPr>
-          <p:cNvPr id="7" name="スライド番号プレースホルダー 6">
+          <p:cNvPr id="17" name="スライド番号プレースホルダー 16">
             <a:extLst>
               <a:ext uri="{FF2B5EF4-FFF2-40B4-BE49-F238E27FC236}">
-                <a16:creationId xmlns:a16="http://schemas.microsoft.com/office/drawing/2014/main" id="{396A6D68-6151-4CB7-B1A4-8BED64B4F879}"/>
+                <a16:creationId xmlns:a16="http://schemas.microsoft.com/office/drawing/2014/main" id="{FB347D0A-278D-4FFA-8292-B586496061DE}"/>
               </a:ext>
             </a:extLst>
           </p:cNvPr>
@@ -11305,10 +11415,10 @@
       </p:sp>
       <p:sp>
         <p:nvSpPr>
-          <p:cNvPr id="12" name="スライド番号プレースホルダー 11">
+          <p:cNvPr id="17" name="スライド番号プレースホルダー 16">
             <a:extLst>
               <a:ext uri="{FF2B5EF4-FFF2-40B4-BE49-F238E27FC236}">
-                <a16:creationId xmlns:a16="http://schemas.microsoft.com/office/drawing/2014/main" id="{EA642DAA-145A-40D5-9EEA-A71101103DB5}"/>
+                <a16:creationId xmlns:a16="http://schemas.microsoft.com/office/drawing/2014/main" id="{C5EF8FDA-B682-4491-B784-9DC2CCE2AF11}"/>
               </a:ext>
             </a:extLst>
           </p:cNvPr>
@@ -11839,10 +11949,10 @@
       </p:sp>
       <p:sp>
         <p:nvSpPr>
-          <p:cNvPr id="7" name="スライド番号プレースホルダー 6">
+          <p:cNvPr id="16" name="スライド番号プレースホルダー 15">
             <a:extLst>
               <a:ext uri="{FF2B5EF4-FFF2-40B4-BE49-F238E27FC236}">
-                <a16:creationId xmlns:a16="http://schemas.microsoft.com/office/drawing/2014/main" id="{DA94CD78-9790-4BAE-A3D5-3334237904D3}"/>
+                <a16:creationId xmlns:a16="http://schemas.microsoft.com/office/drawing/2014/main" id="{F2AAA0B5-799B-4E8B-9ACD-12E83B7CB4EE}"/>
               </a:ext>
             </a:extLst>
           </p:cNvPr>
@@ -12402,10 +12512,10 @@
       </p:sp>
       <p:sp>
         <p:nvSpPr>
-          <p:cNvPr id="7" name="スライド番号プレースホルダー 6">
+          <p:cNvPr id="17" name="スライド番号プレースホルダー 16">
             <a:extLst>
               <a:ext uri="{FF2B5EF4-FFF2-40B4-BE49-F238E27FC236}">
-                <a16:creationId xmlns:a16="http://schemas.microsoft.com/office/drawing/2014/main" id="{2BD9833B-9E7F-4E9B-ABBC-8A292B98E8F1}"/>
+                <a16:creationId xmlns:a16="http://schemas.microsoft.com/office/drawing/2014/main" id="{B125BAEE-F208-4D8B-A31C-A6DE45B8982A}"/>
               </a:ext>
             </a:extLst>
           </p:cNvPr>
@@ -12936,10 +13046,10 @@
       </p:sp>
       <p:sp>
         <p:nvSpPr>
-          <p:cNvPr id="7" name="スライド番号プレースホルダー 6">
+          <p:cNvPr id="17" name="スライド番号プレースホルダー 16">
             <a:extLst>
               <a:ext uri="{FF2B5EF4-FFF2-40B4-BE49-F238E27FC236}">
-                <a16:creationId xmlns:a16="http://schemas.microsoft.com/office/drawing/2014/main" id="{C87529DE-11A3-460D-9D1E-89EBE28B1B6F}"/>
+                <a16:creationId xmlns:a16="http://schemas.microsoft.com/office/drawing/2014/main" id="{29534714-F0BA-4F05-9014-110B5E64D5D0}"/>
               </a:ext>
             </a:extLst>
           </p:cNvPr>
@@ -13510,10 +13620,10 @@
       </p:sp>
       <p:sp>
         <p:nvSpPr>
-          <p:cNvPr id="7" name="スライド番号プレースホルダー 6">
+          <p:cNvPr id="17" name="スライド番号プレースホルダー 16">
             <a:extLst>
               <a:ext uri="{FF2B5EF4-FFF2-40B4-BE49-F238E27FC236}">
-                <a16:creationId xmlns:a16="http://schemas.microsoft.com/office/drawing/2014/main" id="{16003564-6046-4D26-ADDF-C9FA8CCAF01A}"/>
+                <a16:creationId xmlns:a16="http://schemas.microsoft.com/office/drawing/2014/main" id="{93CCBE45-60CC-48F4-BE9D-EA56D1E64594}"/>
               </a:ext>
             </a:extLst>
           </p:cNvPr>
@@ -14106,10 +14216,10 @@
       </p:sp>
       <p:sp>
         <p:nvSpPr>
-          <p:cNvPr id="12" name="スライド番号プレースホルダー 11">
+          <p:cNvPr id="17" name="スライド番号プレースホルダー 16">
             <a:extLst>
               <a:ext uri="{FF2B5EF4-FFF2-40B4-BE49-F238E27FC236}">
-                <a16:creationId xmlns:a16="http://schemas.microsoft.com/office/drawing/2014/main" id="{16AE90CB-E853-4E46-A0A3-0931CD77E5B7}"/>
+                <a16:creationId xmlns:a16="http://schemas.microsoft.com/office/drawing/2014/main" id="{48CA852D-EFCF-4A1D-A308-672B554F1DC0}"/>
               </a:ext>
             </a:extLst>
           </p:cNvPr>
@@ -14694,10 +14804,10 @@
       </p:sp>
       <p:sp>
         <p:nvSpPr>
-          <p:cNvPr id="12" name="スライド番号プレースホルダー 11">
+          <p:cNvPr id="17" name="スライド番号プレースホルダー 16">
             <a:extLst>
               <a:ext uri="{FF2B5EF4-FFF2-40B4-BE49-F238E27FC236}">
-                <a16:creationId xmlns:a16="http://schemas.microsoft.com/office/drawing/2014/main" id="{2205561E-7423-4AAE-819B-FDA355A6A28C}"/>
+                <a16:creationId xmlns:a16="http://schemas.microsoft.com/office/drawing/2014/main" id="{F7C4EC7D-4A64-4C22-87B9-D08B94258403}"/>
               </a:ext>
             </a:extLst>
           </p:cNvPr>
@@ -15684,10 +15794,10 @@
       </p:sp>
       <p:sp>
         <p:nvSpPr>
-          <p:cNvPr id="5" name="スライド番号プレースホルダー 4">
+          <p:cNvPr id="11" name="スライド番号プレースホルダー 10">
             <a:extLst>
               <a:ext uri="{FF2B5EF4-FFF2-40B4-BE49-F238E27FC236}">
-                <a16:creationId xmlns:a16="http://schemas.microsoft.com/office/drawing/2014/main" id="{8B2E2EBE-BF7A-4C28-9B32-DEE949D6D51A}"/>
+                <a16:creationId xmlns:a16="http://schemas.microsoft.com/office/drawing/2014/main" id="{16F4E24F-E9AE-453A-8A50-22CFAB2D5ABD}"/>
               </a:ext>
             </a:extLst>
           </p:cNvPr>
@@ -16238,10 +16348,10 @@
       </p:sp>
       <p:sp>
         <p:nvSpPr>
-          <p:cNvPr id="7" name="スライド番号プレースホルダー 6">
+          <p:cNvPr id="17" name="スライド番号プレースホルダー 16">
             <a:extLst>
               <a:ext uri="{FF2B5EF4-FFF2-40B4-BE49-F238E27FC236}">
-                <a16:creationId xmlns:a16="http://schemas.microsoft.com/office/drawing/2014/main" id="{719C7321-BA23-499F-B2D1-4E1B110AD5B8}"/>
+                <a16:creationId xmlns:a16="http://schemas.microsoft.com/office/drawing/2014/main" id="{AFBEFC17-EFD5-4531-9A49-DA08E8998FEB}"/>
               </a:ext>
             </a:extLst>
           </p:cNvPr>
@@ -16850,10 +16960,10 @@
       </p:sp>
       <p:sp>
         <p:nvSpPr>
-          <p:cNvPr id="7" name="スライド番号プレースホルダー 6">
+          <p:cNvPr id="17" name="スライド番号プレースホルダー 16">
             <a:extLst>
               <a:ext uri="{FF2B5EF4-FFF2-40B4-BE49-F238E27FC236}">
-                <a16:creationId xmlns:a16="http://schemas.microsoft.com/office/drawing/2014/main" id="{1B93EAF8-78C3-450C-9577-3529C5BCD4A0}"/>
+                <a16:creationId xmlns:a16="http://schemas.microsoft.com/office/drawing/2014/main" id="{0FA9F7C3-5B94-4F30-B995-8A45426C6E17}"/>
               </a:ext>
             </a:extLst>
           </p:cNvPr>
@@ -17436,10 +17546,10 @@
       </p:sp>
       <p:sp>
         <p:nvSpPr>
-          <p:cNvPr id="12" name="スライド番号プレースホルダー 11">
+          <p:cNvPr id="17" name="スライド番号プレースホルダー 16">
             <a:extLst>
               <a:ext uri="{FF2B5EF4-FFF2-40B4-BE49-F238E27FC236}">
-                <a16:creationId xmlns:a16="http://schemas.microsoft.com/office/drawing/2014/main" id="{210728E4-C1FE-4961-AFFB-A5E3E541BA49}"/>
+                <a16:creationId xmlns:a16="http://schemas.microsoft.com/office/drawing/2014/main" id="{4C79A0D2-1A35-4FCA-A02B-F6F0B4149404}"/>
               </a:ext>
             </a:extLst>
           </p:cNvPr>
@@ -17980,10 +18090,10 @@
       </p:sp>
       <p:sp>
         <p:nvSpPr>
-          <p:cNvPr id="12" name="スライド番号プレースホルダー 11">
+          <p:cNvPr id="17" name="スライド番号プレースホルダー 16">
             <a:extLst>
               <a:ext uri="{FF2B5EF4-FFF2-40B4-BE49-F238E27FC236}">
-                <a16:creationId xmlns:a16="http://schemas.microsoft.com/office/drawing/2014/main" id="{D800B612-0AB4-4FF1-9E66-59158BD76B88}"/>
+                <a16:creationId xmlns:a16="http://schemas.microsoft.com/office/drawing/2014/main" id="{9770A09D-133F-4C9D-B657-5795A6882FFC}"/>
               </a:ext>
             </a:extLst>
           </p:cNvPr>
@@ -18530,10 +18640,10 @@
       </p:sp>
       <p:sp>
         <p:nvSpPr>
-          <p:cNvPr id="9" name="スライド番号プレースホルダー 8">
+          <p:cNvPr id="17" name="スライド番号プレースホルダー 16">
             <a:extLst>
               <a:ext uri="{FF2B5EF4-FFF2-40B4-BE49-F238E27FC236}">
-                <a16:creationId xmlns:a16="http://schemas.microsoft.com/office/drawing/2014/main" id="{B05E49C1-8D2E-4633-AA72-3FF39FF0E5D5}"/>
+                <a16:creationId xmlns:a16="http://schemas.microsoft.com/office/drawing/2014/main" id="{A0FC63ED-957D-4E76-931A-B5D767BD4134}"/>
               </a:ext>
             </a:extLst>
           </p:cNvPr>
@@ -19109,10 +19219,10 @@
       </p:sp>
       <p:sp>
         <p:nvSpPr>
-          <p:cNvPr id="7" name="スライド番号プレースホルダー 6">
+          <p:cNvPr id="17" name="スライド番号プレースホルダー 16">
             <a:extLst>
               <a:ext uri="{FF2B5EF4-FFF2-40B4-BE49-F238E27FC236}">
-                <a16:creationId xmlns:a16="http://schemas.microsoft.com/office/drawing/2014/main" id="{398CDAF4-7502-4013-9F72-BA1D07882088}"/>
+                <a16:creationId xmlns:a16="http://schemas.microsoft.com/office/drawing/2014/main" id="{CC5A0D25-3EDD-448D-A618-D5142B7EBC2C}"/>
               </a:ext>
             </a:extLst>
           </p:cNvPr>
@@ -19655,10 +19765,10 @@
       </p:sp>
       <p:sp>
         <p:nvSpPr>
-          <p:cNvPr id="8" name="スライド番号プレースホルダー 7">
+          <p:cNvPr id="15" name="スライド番号プレースホルダー 14">
             <a:extLst>
               <a:ext uri="{FF2B5EF4-FFF2-40B4-BE49-F238E27FC236}">
-                <a16:creationId xmlns:a16="http://schemas.microsoft.com/office/drawing/2014/main" id="{F2346687-7D69-4801-B018-5454A0FACA53}"/>
+                <a16:creationId xmlns:a16="http://schemas.microsoft.com/office/drawing/2014/main" id="{A2F46542-960E-4D96-A8F9-E1E5B1CEB773}"/>
               </a:ext>
             </a:extLst>
           </p:cNvPr>
@@ -20181,10 +20291,10 @@
       </p:sp>
       <p:sp>
         <p:nvSpPr>
-          <p:cNvPr id="7" name="スライド番号プレースホルダー 6">
+          <p:cNvPr id="17" name="スライド番号プレースホルダー 16">
             <a:extLst>
               <a:ext uri="{FF2B5EF4-FFF2-40B4-BE49-F238E27FC236}">
-                <a16:creationId xmlns:a16="http://schemas.microsoft.com/office/drawing/2014/main" id="{17643B93-A53F-43B3-BE3C-4803A4F18B10}"/>
+                <a16:creationId xmlns:a16="http://schemas.microsoft.com/office/drawing/2014/main" id="{C53DEAA9-D5DD-4104-B2AB-790C83901BA9}"/>
               </a:ext>
             </a:extLst>
           </p:cNvPr>
@@ -20714,10 +20824,10 @@
       </p:sp>
       <p:sp>
         <p:nvSpPr>
-          <p:cNvPr id="7" name="スライド番号プレースホルダー 6">
+          <p:cNvPr id="17" name="スライド番号プレースホルダー 16">
             <a:extLst>
               <a:ext uri="{FF2B5EF4-FFF2-40B4-BE49-F238E27FC236}">
-                <a16:creationId xmlns:a16="http://schemas.microsoft.com/office/drawing/2014/main" id="{43DF1B20-289C-4CDD-9EBE-E9A9D293879D}"/>
+                <a16:creationId xmlns:a16="http://schemas.microsoft.com/office/drawing/2014/main" id="{D44C8F5C-98B5-4AB3-A469-1F627E027BE6}"/>
               </a:ext>
             </a:extLst>
           </p:cNvPr>
@@ -21273,10 +21383,10 @@
       </p:sp>
       <p:sp>
         <p:nvSpPr>
-          <p:cNvPr id="11" name="スライド番号プレースホルダー 10">
+          <p:cNvPr id="17" name="スライド番号プレースホルダー 16">
             <a:extLst>
               <a:ext uri="{FF2B5EF4-FFF2-40B4-BE49-F238E27FC236}">
-                <a16:creationId xmlns:a16="http://schemas.microsoft.com/office/drawing/2014/main" id="{A0203AD9-C1B0-44ED-A6B3-37A871D8E87D}"/>
+                <a16:creationId xmlns:a16="http://schemas.microsoft.com/office/drawing/2014/main" id="{59ED5FD0-AA8D-46DD-BE90-20CADE78B10D}"/>
               </a:ext>
             </a:extLst>
           </p:cNvPr>
@@ -21821,10 +21931,10 @@
       </p:sp>
       <p:sp>
         <p:nvSpPr>
-          <p:cNvPr id="5" name="スライド番号プレースホルダー 4">
+          <p:cNvPr id="11" name="スライド番号プレースホルダー 10">
             <a:extLst>
               <a:ext uri="{FF2B5EF4-FFF2-40B4-BE49-F238E27FC236}">
-                <a16:creationId xmlns:a16="http://schemas.microsoft.com/office/drawing/2014/main" id="{C59BC17B-2B3D-4D9D-A890-1755943C57BE}"/>
+                <a16:creationId xmlns:a16="http://schemas.microsoft.com/office/drawing/2014/main" id="{7C931F81-1057-4062-AB23-24EDF3A5C96D}"/>
               </a:ext>
             </a:extLst>
           </p:cNvPr>
@@ -22374,10 +22484,10 @@
       </p:sp>
       <p:sp>
         <p:nvSpPr>
-          <p:cNvPr id="10" name="スライド番号プレースホルダー 9">
+          <p:cNvPr id="17" name="スライド番号プレースホルダー 16">
             <a:extLst>
               <a:ext uri="{FF2B5EF4-FFF2-40B4-BE49-F238E27FC236}">
-                <a16:creationId xmlns:a16="http://schemas.microsoft.com/office/drawing/2014/main" id="{0B44D273-0CE7-40AC-8F30-EDC0BB82EC85}"/>
+                <a16:creationId xmlns:a16="http://schemas.microsoft.com/office/drawing/2014/main" id="{CFE5F3C2-A5E5-485D-96CE-C512F7F3C536}"/>
               </a:ext>
             </a:extLst>
           </p:cNvPr>
@@ -22918,10 +23028,10 @@
       </p:sp>
       <p:sp>
         <p:nvSpPr>
-          <p:cNvPr id="9" name="スライド番号プレースホルダー 8">
+          <p:cNvPr id="16" name="スライド番号プレースホルダー 15">
             <a:extLst>
               <a:ext uri="{FF2B5EF4-FFF2-40B4-BE49-F238E27FC236}">
-                <a16:creationId xmlns:a16="http://schemas.microsoft.com/office/drawing/2014/main" id="{001738E5-7984-41F3-8298-306583D7980A}"/>
+                <a16:creationId xmlns:a16="http://schemas.microsoft.com/office/drawing/2014/main" id="{DD2D62FE-D44F-484C-AA19-E1E7A8B5D7E6}"/>
               </a:ext>
             </a:extLst>
           </p:cNvPr>
@@ -23479,10 +23589,10 @@
       </p:sp>
       <p:sp>
         <p:nvSpPr>
-          <p:cNvPr id="7" name="スライド番号プレースホルダー 6">
+          <p:cNvPr id="17" name="スライド番号プレースホルダー 16">
             <a:extLst>
               <a:ext uri="{FF2B5EF4-FFF2-40B4-BE49-F238E27FC236}">
-                <a16:creationId xmlns:a16="http://schemas.microsoft.com/office/drawing/2014/main" id="{69849C8F-EE03-4B83-9F1D-F7D62B4F1C79}"/>
+                <a16:creationId xmlns:a16="http://schemas.microsoft.com/office/drawing/2014/main" id="{4B083F54-03B7-4AA9-A873-9E67D6A61EDA}"/>
               </a:ext>
             </a:extLst>
           </p:cNvPr>
@@ -24017,10 +24127,10 @@
       </p:sp>
       <p:sp>
         <p:nvSpPr>
-          <p:cNvPr id="11" name="スライド番号プレースホルダー 10">
+          <p:cNvPr id="17" name="スライド番号プレースホルダー 16">
             <a:extLst>
               <a:ext uri="{FF2B5EF4-FFF2-40B4-BE49-F238E27FC236}">
-                <a16:creationId xmlns:a16="http://schemas.microsoft.com/office/drawing/2014/main" id="{8083606A-7F04-48C3-83FB-26F9094B3E79}"/>
+                <a16:creationId xmlns:a16="http://schemas.microsoft.com/office/drawing/2014/main" id="{CEC4C1F5-DCD1-42B1-9145-55A836AF62F3}"/>
               </a:ext>
             </a:extLst>
           </p:cNvPr>
@@ -24578,10 +24688,10 @@
       </p:sp>
       <p:sp>
         <p:nvSpPr>
-          <p:cNvPr id="7" name="スライド番号プレースホルダー 6">
+          <p:cNvPr id="17" name="スライド番号プレースホルダー 16">
             <a:extLst>
               <a:ext uri="{FF2B5EF4-FFF2-40B4-BE49-F238E27FC236}">
-                <a16:creationId xmlns:a16="http://schemas.microsoft.com/office/drawing/2014/main" id="{82EE1A66-E341-42B2-8DD4-5CA04DCC2044}"/>
+                <a16:creationId xmlns:a16="http://schemas.microsoft.com/office/drawing/2014/main" id="{DACEC1D4-7120-46EB-832B-75A6334D6F9A}"/>
               </a:ext>
             </a:extLst>
           </p:cNvPr>
@@ -25149,10 +25259,10 @@
       </p:sp>
       <p:sp>
         <p:nvSpPr>
-          <p:cNvPr id="7" name="スライド番号プレースホルダー 6">
+          <p:cNvPr id="17" name="スライド番号プレースホルダー 16">
             <a:extLst>
               <a:ext uri="{FF2B5EF4-FFF2-40B4-BE49-F238E27FC236}">
-                <a16:creationId xmlns:a16="http://schemas.microsoft.com/office/drawing/2014/main" id="{A3B669C1-25D3-42DB-ADB5-20736391E270}"/>
+                <a16:creationId xmlns:a16="http://schemas.microsoft.com/office/drawing/2014/main" id="{8531D386-0963-4678-9BE7-60E60A11A60C}"/>
               </a:ext>
             </a:extLst>
           </p:cNvPr>
@@ -25705,10 +25815,10 @@
       </p:sp>
       <p:sp>
         <p:nvSpPr>
-          <p:cNvPr id="7" name="スライド番号プレースホルダー 6">
+          <p:cNvPr id="17" name="スライド番号プレースホルダー 16">
             <a:extLst>
               <a:ext uri="{FF2B5EF4-FFF2-40B4-BE49-F238E27FC236}">
-                <a16:creationId xmlns:a16="http://schemas.microsoft.com/office/drawing/2014/main" id="{6D19A1C5-2B79-42ED-90C2-7EC84F703597}"/>
+                <a16:creationId xmlns:a16="http://schemas.microsoft.com/office/drawing/2014/main" id="{37588AD6-F50B-44E9-B743-FF2A5AD62A0A}"/>
               </a:ext>
             </a:extLst>
           </p:cNvPr>
@@ -26485,10 +26595,10 @@
       </p:sp>
       <p:sp>
         <p:nvSpPr>
-          <p:cNvPr id="7" name="スライド番号プレースホルダー 6">
+          <p:cNvPr id="16" name="スライド番号プレースホルダー 15">
             <a:extLst>
               <a:ext uri="{FF2B5EF4-FFF2-40B4-BE49-F238E27FC236}">
-                <a16:creationId xmlns:a16="http://schemas.microsoft.com/office/drawing/2014/main" id="{52F511E2-AA80-4567-885C-FA508D132803}"/>
+                <a16:creationId xmlns:a16="http://schemas.microsoft.com/office/drawing/2014/main" id="{7E8881E0-1D6B-4F08-B905-1D5B1B7CED0D}"/>
               </a:ext>
             </a:extLst>
           </p:cNvPr>
@@ -27060,10 +27170,10 @@
       </p:sp>
       <p:sp>
         <p:nvSpPr>
-          <p:cNvPr id="10" name="スライド番号プレースホルダー 9">
+          <p:cNvPr id="17" name="スライド番号プレースホルダー 16">
             <a:extLst>
               <a:ext uri="{FF2B5EF4-FFF2-40B4-BE49-F238E27FC236}">
-                <a16:creationId xmlns:a16="http://schemas.microsoft.com/office/drawing/2014/main" id="{23D52D7F-1BE0-4E86-B96F-2D28E4510F65}"/>
+                <a16:creationId xmlns:a16="http://schemas.microsoft.com/office/drawing/2014/main" id="{E1B9E693-8055-4D93-A2FC-B96B9C2D6FD9}"/>
               </a:ext>
             </a:extLst>
           </p:cNvPr>
@@ -27623,10 +27733,10 @@
       </p:sp>
       <p:sp>
         <p:nvSpPr>
-          <p:cNvPr id="7" name="スライド番号プレースホルダー 6">
+          <p:cNvPr id="17" name="スライド番号プレースホルダー 16">
             <a:extLst>
               <a:ext uri="{FF2B5EF4-FFF2-40B4-BE49-F238E27FC236}">
-                <a16:creationId xmlns:a16="http://schemas.microsoft.com/office/drawing/2014/main" id="{2B1F3538-EDE6-4B57-8EE1-6A6C0C893261}"/>
+                <a16:creationId xmlns:a16="http://schemas.microsoft.com/office/drawing/2014/main" id="{BF4DF70A-C522-4C85-9784-DEC9D2E0EB48}"/>
               </a:ext>
             </a:extLst>
           </p:cNvPr>
@@ -28247,10 +28357,10 @@
       </p:sp>
       <p:sp>
         <p:nvSpPr>
-          <p:cNvPr id="8" name="スライド番号プレースホルダー 7">
+          <p:cNvPr id="17" name="スライド番号プレースホルダー 16">
             <a:extLst>
               <a:ext uri="{FF2B5EF4-FFF2-40B4-BE49-F238E27FC236}">
-                <a16:creationId xmlns:a16="http://schemas.microsoft.com/office/drawing/2014/main" id="{F327C284-F010-4161-8D8D-73308DD7EBA7}"/>
+                <a16:creationId xmlns:a16="http://schemas.microsoft.com/office/drawing/2014/main" id="{28E7E765-6B6F-4239-BD27-B814B4F023DD}"/>
               </a:ext>
             </a:extLst>
           </p:cNvPr>
@@ -28772,10 +28882,10 @@
       </p:sp>
       <p:sp>
         <p:nvSpPr>
-          <p:cNvPr id="7" name="スライド番号プレースホルダー 6">
+          <p:cNvPr id="17" name="スライド番号プレースホルダー 16">
             <a:extLst>
               <a:ext uri="{FF2B5EF4-FFF2-40B4-BE49-F238E27FC236}">
-                <a16:creationId xmlns:a16="http://schemas.microsoft.com/office/drawing/2014/main" id="{61B9DCBA-C955-48F7-8528-0FCE4658C476}"/>
+                <a16:creationId xmlns:a16="http://schemas.microsoft.com/office/drawing/2014/main" id="{47676016-C19D-462B-BE4A-66FF1A22357B}"/>
               </a:ext>
             </a:extLst>
           </p:cNvPr>
@@ -29369,10 +29479,10 @@
       </p:sp>
       <p:sp>
         <p:nvSpPr>
-          <p:cNvPr id="7" name="スライド番号プレースホルダー 6">
+          <p:cNvPr id="17" name="スライド番号プレースホルダー 16">
             <a:extLst>
               <a:ext uri="{FF2B5EF4-FFF2-40B4-BE49-F238E27FC236}">
-                <a16:creationId xmlns:a16="http://schemas.microsoft.com/office/drawing/2014/main" id="{412A2C86-5ED0-40FE-B301-0F595087F851}"/>
+                <a16:creationId xmlns:a16="http://schemas.microsoft.com/office/drawing/2014/main" id="{1A454CF6-28B1-4756-9666-02D74D596212}"/>
               </a:ext>
             </a:extLst>
           </p:cNvPr>
@@ -29908,10 +30018,10 @@
       </p:sp>
       <p:sp>
         <p:nvSpPr>
-          <p:cNvPr id="7" name="スライド番号プレースホルダー 6">
+          <p:cNvPr id="17" name="スライド番号プレースホルダー 16">
             <a:extLst>
               <a:ext uri="{FF2B5EF4-FFF2-40B4-BE49-F238E27FC236}">
-                <a16:creationId xmlns:a16="http://schemas.microsoft.com/office/drawing/2014/main" id="{5606D919-EB94-4D9A-8E12-D6AAC7E59865}"/>
+                <a16:creationId xmlns:a16="http://schemas.microsoft.com/office/drawing/2014/main" id="{3FED9959-5D06-4601-AC8B-C2BC3B8DDAFC}"/>
               </a:ext>
             </a:extLst>
           </p:cNvPr>
@@ -30417,10 +30527,10 @@
       </p:sp>
       <p:sp>
         <p:nvSpPr>
-          <p:cNvPr id="7" name="スライド番号プレースホルダー 6">
+          <p:cNvPr id="16" name="スライド番号プレースホルダー 15">
             <a:extLst>
               <a:ext uri="{FF2B5EF4-FFF2-40B4-BE49-F238E27FC236}">
-                <a16:creationId xmlns:a16="http://schemas.microsoft.com/office/drawing/2014/main" id="{D2391002-1ACD-437D-B10B-B94E96E9CA1F}"/>
+                <a16:creationId xmlns:a16="http://schemas.microsoft.com/office/drawing/2014/main" id="{913F57F1-8C0C-4960-9D16-7455E73D5C1A}"/>
               </a:ext>
             </a:extLst>
           </p:cNvPr>
@@ -31047,10 +31157,10 @@
       </p:sp>
       <p:sp>
         <p:nvSpPr>
-          <p:cNvPr id="7" name="スライド番号プレースホルダー 6">
+          <p:cNvPr id="17" name="スライド番号プレースホルダー 16">
             <a:extLst>
               <a:ext uri="{FF2B5EF4-FFF2-40B4-BE49-F238E27FC236}">
-                <a16:creationId xmlns:a16="http://schemas.microsoft.com/office/drawing/2014/main" id="{A546ED3D-E4A1-4E4A-86B7-49D6E82627B1}"/>
+                <a16:creationId xmlns:a16="http://schemas.microsoft.com/office/drawing/2014/main" id="{D7C635F3-F852-431E-9C32-FBFF2C73B3E0}"/>
               </a:ext>
             </a:extLst>
           </p:cNvPr>
@@ -31639,10 +31749,10 @@
       </p:sp>
       <p:sp>
         <p:nvSpPr>
-          <p:cNvPr id="7" name="スライド番号プレースホルダー 6">
+          <p:cNvPr id="17" name="スライド番号プレースホルダー 16">
             <a:extLst>
               <a:ext uri="{FF2B5EF4-FFF2-40B4-BE49-F238E27FC236}">
-                <a16:creationId xmlns:a16="http://schemas.microsoft.com/office/drawing/2014/main" id="{BA0B9E80-76D1-413C-8583-A6A69D847EE2}"/>
+                <a16:creationId xmlns:a16="http://schemas.microsoft.com/office/drawing/2014/main" id="{65C44FBD-A2E1-4B46-8260-5B488CA04260}"/>
               </a:ext>
             </a:extLst>
           </p:cNvPr>
@@ -32250,10 +32360,10 @@
       </p:sp>
       <p:sp>
         <p:nvSpPr>
-          <p:cNvPr id="8" name="スライド番号プレースホルダー 7">
+          <p:cNvPr id="17" name="スライド番号プレースホルダー 16">
             <a:extLst>
               <a:ext uri="{FF2B5EF4-FFF2-40B4-BE49-F238E27FC236}">
-                <a16:creationId xmlns:a16="http://schemas.microsoft.com/office/drawing/2014/main" id="{D9E80A0D-C934-4C95-8A05-EF987CCEF121}"/>
+                <a16:creationId xmlns:a16="http://schemas.microsoft.com/office/drawing/2014/main" id="{917D837D-8076-4B32-B2F9-F2EEA116EC25}"/>
               </a:ext>
             </a:extLst>
           </p:cNvPr>
@@ -32805,10 +32915,10 @@
       </p:sp>
       <p:sp>
         <p:nvSpPr>
-          <p:cNvPr id="7" name="スライド番号プレースホルダー 6">
+          <p:cNvPr id="17" name="スライド番号プレースホルダー 16">
             <a:extLst>
               <a:ext uri="{FF2B5EF4-FFF2-40B4-BE49-F238E27FC236}">
-                <a16:creationId xmlns:a16="http://schemas.microsoft.com/office/drawing/2014/main" id="{C9DA36E3-C334-4C7E-9ED4-FB418E1E1421}"/>
+                <a16:creationId xmlns:a16="http://schemas.microsoft.com/office/drawing/2014/main" id="{E36D7521-9887-422F-AD8F-D26E3FC5697F}"/>
               </a:ext>
             </a:extLst>
           </p:cNvPr>
@@ -33339,10 +33449,10 @@
       </p:sp>
       <p:sp>
         <p:nvSpPr>
-          <p:cNvPr id="7" name="スライド番号プレースホルダー 6">
+          <p:cNvPr id="17" name="スライド番号プレースホルダー 16">
             <a:extLst>
               <a:ext uri="{FF2B5EF4-FFF2-40B4-BE49-F238E27FC236}">
-                <a16:creationId xmlns:a16="http://schemas.microsoft.com/office/drawing/2014/main" id="{5A1E1FD0-6CB6-40D4-82AB-AE51D72AA008}"/>
+                <a16:creationId xmlns:a16="http://schemas.microsoft.com/office/drawing/2014/main" id="{9799E63C-A780-4618-BF37-4467B80DBFA9}"/>
               </a:ext>
             </a:extLst>
           </p:cNvPr>
@@ -33884,10 +33994,10 @@
       </p:sp>
       <p:sp>
         <p:nvSpPr>
-          <p:cNvPr id="7" name="スライド番号プレースホルダー 6">
+          <p:cNvPr id="17" name="スライド番号プレースホルダー 16">
             <a:extLst>
               <a:ext uri="{FF2B5EF4-FFF2-40B4-BE49-F238E27FC236}">
-                <a16:creationId xmlns:a16="http://schemas.microsoft.com/office/drawing/2014/main" id="{24381094-8961-4979-81F1-2A77E949EB61}"/>
+                <a16:creationId xmlns:a16="http://schemas.microsoft.com/office/drawing/2014/main" id="{FDC3EBFD-2A1D-47CC-ADEC-9422870D9F27}"/>
               </a:ext>
             </a:extLst>
           </p:cNvPr>
@@ -34572,10 +34682,10 @@
       </p:sp>
       <p:sp>
         <p:nvSpPr>
-          <p:cNvPr id="12" name="スライド番号プレースホルダー 11">
+          <p:cNvPr id="17" name="スライド番号プレースホルダー 16">
             <a:extLst>
               <a:ext uri="{FF2B5EF4-FFF2-40B4-BE49-F238E27FC236}">
-                <a16:creationId xmlns:a16="http://schemas.microsoft.com/office/drawing/2014/main" id="{ECC8AC88-0280-48A4-AA32-04677A7D5739}"/>
+                <a16:creationId xmlns:a16="http://schemas.microsoft.com/office/drawing/2014/main" id="{C7623001-01EB-46F2-B450-3EBFF147CA85}"/>
               </a:ext>
             </a:extLst>
           </p:cNvPr>
@@ -35184,10 +35294,10 @@
       </p:sp>
       <p:sp>
         <p:nvSpPr>
-          <p:cNvPr id="8" name="スライド番号プレースホルダー 7">
+          <p:cNvPr id="18" name="スライド番号プレースホルダー 17">
             <a:extLst>
               <a:ext uri="{FF2B5EF4-FFF2-40B4-BE49-F238E27FC236}">
-                <a16:creationId xmlns:a16="http://schemas.microsoft.com/office/drawing/2014/main" id="{C3D96601-6F93-49FA-825E-27314B9F3B90}"/>
+                <a16:creationId xmlns:a16="http://schemas.microsoft.com/office/drawing/2014/main" id="{B630DDB7-EA2F-4308-8AB4-2B34CBA28FA3}"/>
               </a:ext>
             </a:extLst>
           </p:cNvPr>
@@ -35819,10 +35929,10 @@
       </p:sp>
       <p:sp>
         <p:nvSpPr>
-          <p:cNvPr id="7" name="スライド番号プレースホルダー 6">
+          <p:cNvPr id="17" name="スライド番号プレースホルダー 16">
             <a:extLst>
               <a:ext uri="{FF2B5EF4-FFF2-40B4-BE49-F238E27FC236}">
-                <a16:creationId xmlns:a16="http://schemas.microsoft.com/office/drawing/2014/main" id="{28BA4381-190D-4BAE-AF60-A2BD088038B8}"/>
+                <a16:creationId xmlns:a16="http://schemas.microsoft.com/office/drawing/2014/main" id="{7B68DFEE-9A02-4F01-89F1-33871EC902AB}"/>
               </a:ext>
             </a:extLst>
           </p:cNvPr>
@@ -36400,10 +36510,10 @@
       </p:sp>
       <p:sp>
         <p:nvSpPr>
-          <p:cNvPr id="7" name="スライド番号プレースホルダー 6">
+          <p:cNvPr id="17" name="スライド番号プレースホルダー 16">
             <a:extLst>
               <a:ext uri="{FF2B5EF4-FFF2-40B4-BE49-F238E27FC236}">
-                <a16:creationId xmlns:a16="http://schemas.microsoft.com/office/drawing/2014/main" id="{D94B3B27-52A9-4FBF-B582-A89693B76CE1}"/>
+                <a16:creationId xmlns:a16="http://schemas.microsoft.com/office/drawing/2014/main" id="{583A7A52-5075-466A-BEB4-21EFED142C3A}"/>
               </a:ext>
             </a:extLst>
           </p:cNvPr>
@@ -36944,10 +37054,10 @@
       </p:sp>
       <p:sp>
         <p:nvSpPr>
-          <p:cNvPr id="7" name="スライド番号プレースホルダー 6">
+          <p:cNvPr id="17" name="スライド番号プレースホルダー 16">
             <a:extLst>
               <a:ext uri="{FF2B5EF4-FFF2-40B4-BE49-F238E27FC236}">
-                <a16:creationId xmlns:a16="http://schemas.microsoft.com/office/drawing/2014/main" id="{E2957FFD-83E8-43EB-BB64-5565A4928D6E}"/>
+                <a16:creationId xmlns:a16="http://schemas.microsoft.com/office/drawing/2014/main" id="{18DDB2D0-3317-4BDE-A97E-CC2D91F0DFC1}"/>
               </a:ext>
             </a:extLst>
           </p:cNvPr>
@@ -37476,10 +37586,10 @@
       </p:sp>
       <p:sp>
         <p:nvSpPr>
-          <p:cNvPr id="7" name="スライド番号プレースホルダー 6">
+          <p:cNvPr id="17" name="スライド番号プレースホルダー 16">
             <a:extLst>
               <a:ext uri="{FF2B5EF4-FFF2-40B4-BE49-F238E27FC236}">
-                <a16:creationId xmlns:a16="http://schemas.microsoft.com/office/drawing/2014/main" id="{0B2AF0AC-5260-4FDF-878E-E935F09FAE9A}"/>
+                <a16:creationId xmlns:a16="http://schemas.microsoft.com/office/drawing/2014/main" id="{E4D9D567-23FA-473A-B9C5-6CDAEFB8D31E}"/>
               </a:ext>
             </a:extLst>
           </p:cNvPr>
@@ -38073,10 +38183,10 @@
       </p:sp>
       <p:sp>
         <p:nvSpPr>
-          <p:cNvPr id="7" name="スライド番号プレースホルダー 6">
+          <p:cNvPr id="17" name="スライド番号プレースホルダー 16">
             <a:extLst>
               <a:ext uri="{FF2B5EF4-FFF2-40B4-BE49-F238E27FC236}">
-                <a16:creationId xmlns:a16="http://schemas.microsoft.com/office/drawing/2014/main" id="{FF7B357F-4795-4435-A7A6-77010FA284DA}"/>
+                <a16:creationId xmlns:a16="http://schemas.microsoft.com/office/drawing/2014/main" id="{48441F26-A194-4D79-8E07-BB0D284CF575}"/>
               </a:ext>
             </a:extLst>
           </p:cNvPr>
@@ -38377,10 +38487,10 @@
       </p:sp>
       <p:sp>
         <p:nvSpPr>
-          <p:cNvPr id="6" name="スライド番号プレースホルダー 5">
+          <p:cNvPr id="11" name="スライド番号プレースホルダー 10">
             <a:extLst>
               <a:ext uri="{FF2B5EF4-FFF2-40B4-BE49-F238E27FC236}">
-                <a16:creationId xmlns:a16="http://schemas.microsoft.com/office/drawing/2014/main" id="{9D4B34D2-A5A4-41BF-9838-54B6C64A5E31}"/>
+                <a16:creationId xmlns:a16="http://schemas.microsoft.com/office/drawing/2014/main" id="{20B40B25-ED90-48AE-A02E-7BFFB8D5D1BA}"/>
               </a:ext>
             </a:extLst>
           </p:cNvPr>
@@ -39227,10 +39337,10 @@
       </p:sp>
       <p:sp>
         <p:nvSpPr>
-          <p:cNvPr id="13" name="スライド番号プレースホルダー 12">
+          <p:cNvPr id="18" name="スライド番号プレースホルダー 17">
             <a:extLst>
               <a:ext uri="{FF2B5EF4-FFF2-40B4-BE49-F238E27FC236}">
-                <a16:creationId xmlns:a16="http://schemas.microsoft.com/office/drawing/2014/main" id="{EA59AB87-95E6-42A8-9681-12C262506390}"/>
+                <a16:creationId xmlns:a16="http://schemas.microsoft.com/office/drawing/2014/main" id="{B30FA8CF-19A5-42B7-B809-832FD493C1F3}"/>
               </a:ext>
             </a:extLst>
           </p:cNvPr>
@@ -39836,10 +39946,10 @@
       </p:sp>
       <p:sp>
         <p:nvSpPr>
-          <p:cNvPr id="7" name="スライド番号プレースホルダー 6">
+          <p:cNvPr id="17" name="スライド番号プレースホルダー 16">
             <a:extLst>
               <a:ext uri="{FF2B5EF4-FFF2-40B4-BE49-F238E27FC236}">
-                <a16:creationId xmlns:a16="http://schemas.microsoft.com/office/drawing/2014/main" id="{56BA3ECA-5960-4A06-9783-C10F4FA417E3}"/>
+                <a16:creationId xmlns:a16="http://schemas.microsoft.com/office/drawing/2014/main" id="{A73B4A02-42CA-46E6-9A89-2D688F53BBFB}"/>
               </a:ext>
             </a:extLst>
           </p:cNvPr>
@@ -40406,10 +40516,10 @@
       </p:sp>
       <p:sp>
         <p:nvSpPr>
-          <p:cNvPr id="12" name="スライド番号プレースホルダー 11">
+          <p:cNvPr id="17" name="スライド番号プレースホルダー 16">
             <a:extLst>
               <a:ext uri="{FF2B5EF4-FFF2-40B4-BE49-F238E27FC236}">
-                <a16:creationId xmlns:a16="http://schemas.microsoft.com/office/drawing/2014/main" id="{A4D52D80-B4C0-488F-B586-446475EE3142}"/>
+                <a16:creationId xmlns:a16="http://schemas.microsoft.com/office/drawing/2014/main" id="{0EF38626-A446-46D6-B746-6AF0A1D014EE}"/>
               </a:ext>
             </a:extLst>
           </p:cNvPr>
@@ -40990,10 +41100,10 @@
       </p:sp>
       <p:sp>
         <p:nvSpPr>
-          <p:cNvPr id="7" name="スライド番号プレースホルダー 6">
+          <p:cNvPr id="17" name="スライド番号プレースホルダー 16">
             <a:extLst>
               <a:ext uri="{FF2B5EF4-FFF2-40B4-BE49-F238E27FC236}">
-                <a16:creationId xmlns:a16="http://schemas.microsoft.com/office/drawing/2014/main" id="{50FD1833-0EF8-4408-833F-C4DE759E9D59}"/>
+                <a16:creationId xmlns:a16="http://schemas.microsoft.com/office/drawing/2014/main" id="{9DCE5E1D-614A-454B-9912-FCC0B5F8953A}"/>
               </a:ext>
             </a:extLst>
           </p:cNvPr>

</xml_diff>

<commit_message>
Changed notes on the cover page.
The wording of the notes on the cover page of "Frequent Misunderstandings of OSS licenses V7" has been changed.

"Frequent Misunderstandings of OSS licenses V7"の表紙に記載した注記の表現を変更しました。
</commit_message>
<xml_diff>
--- a/Education_Material/FAQ/Misunderstandings_of_OSS_licenses_CC0.pptx
+++ b/Education_Material/FAQ/Misunderstandings_of_OSS_licenses_CC0.pptx
@@ -8847,7 +8847,7 @@
                 <a:ea typeface="Meiryo UI" panose="020B0604030504040204" pitchFamily="50" charset="-128"/>
                 <a:cs typeface="Meiryo UI" panose="020B0604030504040204" pitchFamily="50" charset="-128"/>
               </a:rPr>
-              <a:t>◆This FAQ is based on Japanese law. Laws vary from country to country, and  </a:t>
+              <a:t>◆The answers to the FAQ are based on business practices of Japan WG FAQ </a:t>
             </a:r>
             <a:br>
               <a:rPr lang="en-US" altLang="ja-JP" sz="2400" b="1" dirty="0">
@@ -8860,6 +8860,17 @@
               </a:rPr>
             </a:br>
             <a:r>
+              <a:rPr lang="ja-JP" altLang="en-US" sz="2400" b="1" dirty="0">
+                <a:solidFill>
+                  <a:schemeClr val="tx1"/>
+                </a:solidFill>
+                <a:latin typeface="Meiryo UI" panose="020B0604030504040204" pitchFamily="50" charset="-128"/>
+                <a:ea typeface="Meiryo UI" panose="020B0604030504040204" pitchFamily="50" charset="-128"/>
+                <a:cs typeface="Meiryo UI" panose="020B0604030504040204" pitchFamily="50" charset="-128"/>
+              </a:rPr>
+              <a:t>　</a:t>
+            </a:r>
+            <a:r>
               <a:rPr lang="en-US" altLang="ja-JP" sz="2400" b="1" dirty="0">
                 <a:solidFill>
                   <a:schemeClr val="tx1"/>
@@ -8868,7 +8879,7 @@
                 <a:ea typeface="Meiryo UI" panose="020B0604030504040204" pitchFamily="50" charset="-128"/>
                 <a:cs typeface="Meiryo UI" panose="020B0604030504040204" pitchFamily="50" charset="-128"/>
               </a:rPr>
-              <a:t>  measures for each case may vary from company to company. Consult your </a:t>
+              <a:t>Subgroup members in Japan. The interpretation on OSS license may vary </a:t>
             </a:r>
             <a:br>
               <a:rPr lang="en-US" altLang="ja-JP" sz="2400" b="1" dirty="0">
@@ -8889,7 +8900,28 @@
                 <a:ea typeface="Meiryo UI" panose="020B0604030504040204" pitchFamily="50" charset="-128"/>
                 <a:cs typeface="Meiryo UI" panose="020B0604030504040204" pitchFamily="50" charset="-128"/>
               </a:rPr>
-              <a:t>  company or organization's intellectual property counsel for specific issues.</a:t>
+              <a:t>  depending on the customary practice and/or judicial district. Consult your </a:t>
+            </a:r>
+            <a:br>
+              <a:rPr lang="en-US" altLang="ja-JP" sz="2400" b="1" dirty="0">
+                <a:solidFill>
+                  <a:schemeClr val="tx1"/>
+                </a:solidFill>
+                <a:latin typeface="Meiryo UI" panose="020B0604030504040204" pitchFamily="50" charset="-128"/>
+                <a:ea typeface="Meiryo UI" panose="020B0604030504040204" pitchFamily="50" charset="-128"/>
+                <a:cs typeface="Meiryo UI" panose="020B0604030504040204" pitchFamily="50" charset="-128"/>
+              </a:rPr>
+            </a:br>
+            <a:r>
+              <a:rPr lang="en-US" altLang="ja-JP" sz="2400" b="1" dirty="0">
+                <a:solidFill>
+                  <a:schemeClr val="tx1"/>
+                </a:solidFill>
+                <a:latin typeface="Meiryo UI" panose="020B0604030504040204" pitchFamily="50" charset="-128"/>
+                <a:ea typeface="Meiryo UI" panose="020B0604030504040204" pitchFamily="50" charset="-128"/>
+                <a:cs typeface="Meiryo UI" panose="020B0604030504040204" pitchFamily="50" charset="-128"/>
+              </a:rPr>
+              <a:t>  company or organization's intellectual property counsel for specific issues. </a:t>
             </a:r>
           </a:p>
           <a:p>
@@ -8978,7 +9010,7 @@
                 <a:ea typeface="Meiryo UI" panose="020B0604030504040204" pitchFamily="50" charset="-128"/>
                 <a:cs typeface="Meiryo UI" panose="020B0604030504040204" pitchFamily="50" charset="-128"/>
               </a:rPr>
-              <a:t> (FAQ sub-WG)]</a:t>
+              <a:t> (FAQ Subgroup)]</a:t>
             </a:r>
           </a:p>
           <a:p>
@@ -9669,10 +9701,10 @@
       </p:sp>
       <p:sp>
         <p:nvSpPr>
-          <p:cNvPr id="17" name="スライド番号プレースホルダー 16">
+          <p:cNvPr id="21" name="スライド番号プレースホルダー 20">
             <a:extLst>
               <a:ext uri="{FF2B5EF4-FFF2-40B4-BE49-F238E27FC236}">
-                <a16:creationId xmlns:a16="http://schemas.microsoft.com/office/drawing/2014/main" id="{8FBFE7F3-7E06-4D73-B616-5F8E47E3E556}"/>
+                <a16:creationId xmlns:a16="http://schemas.microsoft.com/office/drawing/2014/main" id="{B2FB965B-B725-40C5-AC3A-BE562DDF5353}"/>
               </a:ext>
             </a:extLst>
           </p:cNvPr>
@@ -10274,10 +10306,10 @@
       </p:sp>
       <p:sp>
         <p:nvSpPr>
-          <p:cNvPr id="17" name="スライド番号プレースホルダー 16">
+          <p:cNvPr id="21" name="スライド番号プレースホルダー 20">
             <a:extLst>
               <a:ext uri="{FF2B5EF4-FFF2-40B4-BE49-F238E27FC236}">
-                <a16:creationId xmlns:a16="http://schemas.microsoft.com/office/drawing/2014/main" id="{DD06363C-A27F-4343-AB34-BD96C0202564}"/>
+                <a16:creationId xmlns:a16="http://schemas.microsoft.com/office/drawing/2014/main" id="{F5993DC9-AB3C-4AF5-B008-C38565BF9884}"/>
               </a:ext>
             </a:extLst>
           </p:cNvPr>
@@ -10879,10 +10911,10 @@
       </p:sp>
       <p:sp>
         <p:nvSpPr>
-          <p:cNvPr id="17" name="スライド番号プレースホルダー 16">
+          <p:cNvPr id="21" name="スライド番号プレースホルダー 20">
             <a:extLst>
               <a:ext uri="{FF2B5EF4-FFF2-40B4-BE49-F238E27FC236}">
-                <a16:creationId xmlns:a16="http://schemas.microsoft.com/office/drawing/2014/main" id="{FB347D0A-278D-4FFA-8292-B586496061DE}"/>
+                <a16:creationId xmlns:a16="http://schemas.microsoft.com/office/drawing/2014/main" id="{C89526B4-311E-4F5C-8E8E-016125C293ED}"/>
               </a:ext>
             </a:extLst>
           </p:cNvPr>
@@ -11415,10 +11447,10 @@
       </p:sp>
       <p:sp>
         <p:nvSpPr>
-          <p:cNvPr id="17" name="スライド番号プレースホルダー 16">
+          <p:cNvPr id="21" name="スライド番号プレースホルダー 20">
             <a:extLst>
               <a:ext uri="{FF2B5EF4-FFF2-40B4-BE49-F238E27FC236}">
-                <a16:creationId xmlns:a16="http://schemas.microsoft.com/office/drawing/2014/main" id="{C5EF8FDA-B682-4491-B784-9DC2CCE2AF11}"/>
+                <a16:creationId xmlns:a16="http://schemas.microsoft.com/office/drawing/2014/main" id="{7D3089D4-9667-4560-A575-27E74CCE9178}"/>
               </a:ext>
             </a:extLst>
           </p:cNvPr>
@@ -11949,10 +11981,10 @@
       </p:sp>
       <p:sp>
         <p:nvSpPr>
-          <p:cNvPr id="16" name="スライド番号プレースホルダー 15">
+          <p:cNvPr id="21" name="スライド番号プレースホルダー 20">
             <a:extLst>
               <a:ext uri="{FF2B5EF4-FFF2-40B4-BE49-F238E27FC236}">
-                <a16:creationId xmlns:a16="http://schemas.microsoft.com/office/drawing/2014/main" id="{F2AAA0B5-799B-4E8B-9ACD-12E83B7CB4EE}"/>
+                <a16:creationId xmlns:a16="http://schemas.microsoft.com/office/drawing/2014/main" id="{ED88BD01-9400-4633-9438-237D483EA298}"/>
               </a:ext>
             </a:extLst>
           </p:cNvPr>
@@ -12512,10 +12544,10 @@
       </p:sp>
       <p:sp>
         <p:nvSpPr>
-          <p:cNvPr id="17" name="スライド番号プレースホルダー 16">
+          <p:cNvPr id="21" name="スライド番号プレースホルダー 20">
             <a:extLst>
               <a:ext uri="{FF2B5EF4-FFF2-40B4-BE49-F238E27FC236}">
-                <a16:creationId xmlns:a16="http://schemas.microsoft.com/office/drawing/2014/main" id="{B125BAEE-F208-4D8B-A31C-A6DE45B8982A}"/>
+                <a16:creationId xmlns:a16="http://schemas.microsoft.com/office/drawing/2014/main" id="{2D106099-6BC2-400C-9A88-1C79346F8A0E}"/>
               </a:ext>
             </a:extLst>
           </p:cNvPr>
@@ -13046,10 +13078,10 @@
       </p:sp>
       <p:sp>
         <p:nvSpPr>
-          <p:cNvPr id="17" name="スライド番号プレースホルダー 16">
+          <p:cNvPr id="21" name="スライド番号プレースホルダー 20">
             <a:extLst>
               <a:ext uri="{FF2B5EF4-FFF2-40B4-BE49-F238E27FC236}">
-                <a16:creationId xmlns:a16="http://schemas.microsoft.com/office/drawing/2014/main" id="{29534714-F0BA-4F05-9014-110B5E64D5D0}"/>
+                <a16:creationId xmlns:a16="http://schemas.microsoft.com/office/drawing/2014/main" id="{844DCFA7-9D42-4E3D-A78A-AC4D11CEA3BB}"/>
               </a:ext>
             </a:extLst>
           </p:cNvPr>
@@ -13620,10 +13652,10 @@
       </p:sp>
       <p:sp>
         <p:nvSpPr>
-          <p:cNvPr id="17" name="スライド番号プレースホルダー 16">
+          <p:cNvPr id="21" name="スライド番号プレースホルダー 20">
             <a:extLst>
               <a:ext uri="{FF2B5EF4-FFF2-40B4-BE49-F238E27FC236}">
-                <a16:creationId xmlns:a16="http://schemas.microsoft.com/office/drawing/2014/main" id="{93CCBE45-60CC-48F4-BE9D-EA56D1E64594}"/>
+                <a16:creationId xmlns:a16="http://schemas.microsoft.com/office/drawing/2014/main" id="{3F1E12A7-D505-4BA4-A14A-AF86F12B22AF}"/>
               </a:ext>
             </a:extLst>
           </p:cNvPr>
@@ -14216,10 +14248,10 @@
       </p:sp>
       <p:sp>
         <p:nvSpPr>
-          <p:cNvPr id="17" name="スライド番号プレースホルダー 16">
+          <p:cNvPr id="21" name="スライド番号プレースホルダー 20">
             <a:extLst>
               <a:ext uri="{FF2B5EF4-FFF2-40B4-BE49-F238E27FC236}">
-                <a16:creationId xmlns:a16="http://schemas.microsoft.com/office/drawing/2014/main" id="{48CA852D-EFCF-4A1D-A308-672B554F1DC0}"/>
+                <a16:creationId xmlns:a16="http://schemas.microsoft.com/office/drawing/2014/main" id="{56ED573B-A821-4F8A-B894-E671C90E0645}"/>
               </a:ext>
             </a:extLst>
           </p:cNvPr>
@@ -14804,10 +14836,10 @@
       </p:sp>
       <p:sp>
         <p:nvSpPr>
-          <p:cNvPr id="17" name="スライド番号プレースホルダー 16">
+          <p:cNvPr id="21" name="スライド番号プレースホルダー 20">
             <a:extLst>
               <a:ext uri="{FF2B5EF4-FFF2-40B4-BE49-F238E27FC236}">
-                <a16:creationId xmlns:a16="http://schemas.microsoft.com/office/drawing/2014/main" id="{F7C4EC7D-4A64-4C22-87B9-D08B94258403}"/>
+                <a16:creationId xmlns:a16="http://schemas.microsoft.com/office/drawing/2014/main" id="{1DFD30CA-33F3-4760-AF34-FB945C3A229E}"/>
               </a:ext>
             </a:extLst>
           </p:cNvPr>
@@ -15794,10 +15826,10 @@
       </p:sp>
       <p:sp>
         <p:nvSpPr>
-          <p:cNvPr id="11" name="スライド番号プレースホルダー 10">
+          <p:cNvPr id="15" name="スライド番号プレースホルダー 14">
             <a:extLst>
               <a:ext uri="{FF2B5EF4-FFF2-40B4-BE49-F238E27FC236}">
-                <a16:creationId xmlns:a16="http://schemas.microsoft.com/office/drawing/2014/main" id="{16F4E24F-E9AE-453A-8A50-22CFAB2D5ABD}"/>
+                <a16:creationId xmlns:a16="http://schemas.microsoft.com/office/drawing/2014/main" id="{E555AA4B-58A2-4BC0-8AF7-0F5BC37735D7}"/>
               </a:ext>
             </a:extLst>
           </p:cNvPr>
@@ -16348,10 +16380,10 @@
       </p:sp>
       <p:sp>
         <p:nvSpPr>
-          <p:cNvPr id="17" name="スライド番号プレースホルダー 16">
+          <p:cNvPr id="21" name="スライド番号プレースホルダー 20">
             <a:extLst>
               <a:ext uri="{FF2B5EF4-FFF2-40B4-BE49-F238E27FC236}">
-                <a16:creationId xmlns:a16="http://schemas.microsoft.com/office/drawing/2014/main" id="{AFBEFC17-EFD5-4531-9A49-DA08E8998FEB}"/>
+                <a16:creationId xmlns:a16="http://schemas.microsoft.com/office/drawing/2014/main" id="{528FF3D8-E6BA-4B59-AB8C-B4F3034E1742}"/>
               </a:ext>
             </a:extLst>
           </p:cNvPr>
@@ -16960,10 +16992,10 @@
       </p:sp>
       <p:sp>
         <p:nvSpPr>
-          <p:cNvPr id="17" name="スライド番号プレースホルダー 16">
+          <p:cNvPr id="21" name="スライド番号プレースホルダー 20">
             <a:extLst>
               <a:ext uri="{FF2B5EF4-FFF2-40B4-BE49-F238E27FC236}">
-                <a16:creationId xmlns:a16="http://schemas.microsoft.com/office/drawing/2014/main" id="{0FA9F7C3-5B94-4F30-B995-8A45426C6E17}"/>
+                <a16:creationId xmlns:a16="http://schemas.microsoft.com/office/drawing/2014/main" id="{ADEE1056-AFEB-4F3F-B3DA-E3552F867FF7}"/>
               </a:ext>
             </a:extLst>
           </p:cNvPr>
@@ -17546,10 +17578,10 @@
       </p:sp>
       <p:sp>
         <p:nvSpPr>
-          <p:cNvPr id="17" name="スライド番号プレースホルダー 16">
+          <p:cNvPr id="21" name="スライド番号プレースホルダー 20">
             <a:extLst>
               <a:ext uri="{FF2B5EF4-FFF2-40B4-BE49-F238E27FC236}">
-                <a16:creationId xmlns:a16="http://schemas.microsoft.com/office/drawing/2014/main" id="{4C79A0D2-1A35-4FCA-A02B-F6F0B4149404}"/>
+                <a16:creationId xmlns:a16="http://schemas.microsoft.com/office/drawing/2014/main" id="{7B2859FD-E392-46C5-BC3A-705B638E1791}"/>
               </a:ext>
             </a:extLst>
           </p:cNvPr>
@@ -18090,10 +18122,10 @@
       </p:sp>
       <p:sp>
         <p:nvSpPr>
-          <p:cNvPr id="17" name="スライド番号プレースホルダー 16">
+          <p:cNvPr id="21" name="スライド番号プレースホルダー 20">
             <a:extLst>
               <a:ext uri="{FF2B5EF4-FFF2-40B4-BE49-F238E27FC236}">
-                <a16:creationId xmlns:a16="http://schemas.microsoft.com/office/drawing/2014/main" id="{9770A09D-133F-4C9D-B657-5795A6882FFC}"/>
+                <a16:creationId xmlns:a16="http://schemas.microsoft.com/office/drawing/2014/main" id="{CA68C4FD-DE05-43D0-A6D5-15F75DC9DD5B}"/>
               </a:ext>
             </a:extLst>
           </p:cNvPr>
@@ -18640,10 +18672,10 @@
       </p:sp>
       <p:sp>
         <p:nvSpPr>
-          <p:cNvPr id="17" name="スライド番号プレースホルダー 16">
+          <p:cNvPr id="21" name="スライド番号プレースホルダー 20">
             <a:extLst>
               <a:ext uri="{FF2B5EF4-FFF2-40B4-BE49-F238E27FC236}">
-                <a16:creationId xmlns:a16="http://schemas.microsoft.com/office/drawing/2014/main" id="{A0FC63ED-957D-4E76-931A-B5D767BD4134}"/>
+                <a16:creationId xmlns:a16="http://schemas.microsoft.com/office/drawing/2014/main" id="{13E02B4F-B387-4D0E-A853-2C8D214EF0C2}"/>
               </a:ext>
             </a:extLst>
           </p:cNvPr>
@@ -19219,10 +19251,10 @@
       </p:sp>
       <p:sp>
         <p:nvSpPr>
-          <p:cNvPr id="17" name="スライド番号プレースホルダー 16">
+          <p:cNvPr id="21" name="スライド番号プレースホルダー 20">
             <a:extLst>
               <a:ext uri="{FF2B5EF4-FFF2-40B4-BE49-F238E27FC236}">
-                <a16:creationId xmlns:a16="http://schemas.microsoft.com/office/drawing/2014/main" id="{CC5A0D25-3EDD-448D-A618-D5142B7EBC2C}"/>
+                <a16:creationId xmlns:a16="http://schemas.microsoft.com/office/drawing/2014/main" id="{21F3E775-2D7D-4BFB-A26B-D99992B35DB3}"/>
               </a:ext>
             </a:extLst>
           </p:cNvPr>
@@ -19765,10 +19797,10 @@
       </p:sp>
       <p:sp>
         <p:nvSpPr>
-          <p:cNvPr id="15" name="スライド番号プレースホルダー 14">
+          <p:cNvPr id="21" name="スライド番号プレースホルダー 20">
             <a:extLst>
               <a:ext uri="{FF2B5EF4-FFF2-40B4-BE49-F238E27FC236}">
-                <a16:creationId xmlns:a16="http://schemas.microsoft.com/office/drawing/2014/main" id="{A2F46542-960E-4D96-A8F9-E1E5B1CEB773}"/>
+                <a16:creationId xmlns:a16="http://schemas.microsoft.com/office/drawing/2014/main" id="{784FFCD7-A911-4C00-B003-99E43EDEAA14}"/>
               </a:ext>
             </a:extLst>
           </p:cNvPr>
@@ -20291,10 +20323,10 @@
       </p:sp>
       <p:sp>
         <p:nvSpPr>
-          <p:cNvPr id="17" name="スライド番号プレースホルダー 16">
+          <p:cNvPr id="21" name="スライド番号プレースホルダー 20">
             <a:extLst>
               <a:ext uri="{FF2B5EF4-FFF2-40B4-BE49-F238E27FC236}">
-                <a16:creationId xmlns:a16="http://schemas.microsoft.com/office/drawing/2014/main" id="{C53DEAA9-D5DD-4104-B2AB-790C83901BA9}"/>
+                <a16:creationId xmlns:a16="http://schemas.microsoft.com/office/drawing/2014/main" id="{544894BB-7B81-411A-AC30-A68CAD40A06D}"/>
               </a:ext>
             </a:extLst>
           </p:cNvPr>
@@ -20824,10 +20856,10 @@
       </p:sp>
       <p:sp>
         <p:nvSpPr>
-          <p:cNvPr id="17" name="スライド番号プレースホルダー 16">
+          <p:cNvPr id="21" name="スライド番号プレースホルダー 20">
             <a:extLst>
               <a:ext uri="{FF2B5EF4-FFF2-40B4-BE49-F238E27FC236}">
-                <a16:creationId xmlns:a16="http://schemas.microsoft.com/office/drawing/2014/main" id="{D44C8F5C-98B5-4AB3-A469-1F627E027BE6}"/>
+                <a16:creationId xmlns:a16="http://schemas.microsoft.com/office/drawing/2014/main" id="{B0E17D81-A59E-4199-A176-50DD12C7FFA4}"/>
               </a:ext>
             </a:extLst>
           </p:cNvPr>
@@ -21383,10 +21415,10 @@
       </p:sp>
       <p:sp>
         <p:nvSpPr>
-          <p:cNvPr id="17" name="スライド番号プレースホルダー 16">
+          <p:cNvPr id="21" name="スライド番号プレースホルダー 20">
             <a:extLst>
               <a:ext uri="{FF2B5EF4-FFF2-40B4-BE49-F238E27FC236}">
-                <a16:creationId xmlns:a16="http://schemas.microsoft.com/office/drawing/2014/main" id="{59ED5FD0-AA8D-46DD-BE90-20CADE78B10D}"/>
+                <a16:creationId xmlns:a16="http://schemas.microsoft.com/office/drawing/2014/main" id="{4B5AA788-641E-4469-9461-229C2B17AC68}"/>
               </a:ext>
             </a:extLst>
           </p:cNvPr>
@@ -21931,10 +21963,10 @@
       </p:sp>
       <p:sp>
         <p:nvSpPr>
-          <p:cNvPr id="11" name="スライド番号プレースホルダー 10">
+          <p:cNvPr id="15" name="スライド番号プレースホルダー 14">
             <a:extLst>
               <a:ext uri="{FF2B5EF4-FFF2-40B4-BE49-F238E27FC236}">
-                <a16:creationId xmlns:a16="http://schemas.microsoft.com/office/drawing/2014/main" id="{7C931F81-1057-4062-AB23-24EDF3A5C96D}"/>
+                <a16:creationId xmlns:a16="http://schemas.microsoft.com/office/drawing/2014/main" id="{060700CA-FA02-4051-9361-1B9CD1B065C4}"/>
               </a:ext>
             </a:extLst>
           </p:cNvPr>
@@ -22484,10 +22516,10 @@
       </p:sp>
       <p:sp>
         <p:nvSpPr>
-          <p:cNvPr id="17" name="スライド番号プレースホルダー 16">
+          <p:cNvPr id="21" name="スライド番号プレースホルダー 20">
             <a:extLst>
               <a:ext uri="{FF2B5EF4-FFF2-40B4-BE49-F238E27FC236}">
-                <a16:creationId xmlns:a16="http://schemas.microsoft.com/office/drawing/2014/main" id="{CFE5F3C2-A5E5-485D-96CE-C512F7F3C536}"/>
+                <a16:creationId xmlns:a16="http://schemas.microsoft.com/office/drawing/2014/main" id="{262AF6F0-110E-48DB-8F55-212BAED77A7A}"/>
               </a:ext>
             </a:extLst>
           </p:cNvPr>
@@ -23028,10 +23060,10 @@
       </p:sp>
       <p:sp>
         <p:nvSpPr>
-          <p:cNvPr id="16" name="スライド番号プレースホルダー 15">
+          <p:cNvPr id="21" name="スライド番号プレースホルダー 20">
             <a:extLst>
               <a:ext uri="{FF2B5EF4-FFF2-40B4-BE49-F238E27FC236}">
-                <a16:creationId xmlns:a16="http://schemas.microsoft.com/office/drawing/2014/main" id="{DD2D62FE-D44F-484C-AA19-E1E7A8B5D7E6}"/>
+                <a16:creationId xmlns:a16="http://schemas.microsoft.com/office/drawing/2014/main" id="{BA3CA8D4-BA15-4438-A797-9ADB9F48CEC1}"/>
               </a:ext>
             </a:extLst>
           </p:cNvPr>
@@ -23589,10 +23621,10 @@
       </p:sp>
       <p:sp>
         <p:nvSpPr>
-          <p:cNvPr id="17" name="スライド番号プレースホルダー 16">
+          <p:cNvPr id="21" name="スライド番号プレースホルダー 20">
             <a:extLst>
               <a:ext uri="{FF2B5EF4-FFF2-40B4-BE49-F238E27FC236}">
-                <a16:creationId xmlns:a16="http://schemas.microsoft.com/office/drawing/2014/main" id="{4B083F54-03B7-4AA9-A873-9E67D6A61EDA}"/>
+                <a16:creationId xmlns:a16="http://schemas.microsoft.com/office/drawing/2014/main" id="{6A472DD4-9AFA-4284-9ADE-7718927913D2}"/>
               </a:ext>
             </a:extLst>
           </p:cNvPr>
@@ -24127,10 +24159,10 @@
       </p:sp>
       <p:sp>
         <p:nvSpPr>
-          <p:cNvPr id="17" name="スライド番号プレースホルダー 16">
+          <p:cNvPr id="21" name="スライド番号プレースホルダー 20">
             <a:extLst>
               <a:ext uri="{FF2B5EF4-FFF2-40B4-BE49-F238E27FC236}">
-                <a16:creationId xmlns:a16="http://schemas.microsoft.com/office/drawing/2014/main" id="{CEC4C1F5-DCD1-42B1-9145-55A836AF62F3}"/>
+                <a16:creationId xmlns:a16="http://schemas.microsoft.com/office/drawing/2014/main" id="{E427D4A9-4F1D-4F1E-993E-A68509CBA367}"/>
               </a:ext>
             </a:extLst>
           </p:cNvPr>
@@ -24688,10 +24720,10 @@
       </p:sp>
       <p:sp>
         <p:nvSpPr>
-          <p:cNvPr id="17" name="スライド番号プレースホルダー 16">
+          <p:cNvPr id="21" name="スライド番号プレースホルダー 20">
             <a:extLst>
               <a:ext uri="{FF2B5EF4-FFF2-40B4-BE49-F238E27FC236}">
-                <a16:creationId xmlns:a16="http://schemas.microsoft.com/office/drawing/2014/main" id="{DACEC1D4-7120-46EB-832B-75A6334D6F9A}"/>
+                <a16:creationId xmlns:a16="http://schemas.microsoft.com/office/drawing/2014/main" id="{F3159CDC-5654-4E32-B36C-1A52FB3EDD21}"/>
               </a:ext>
             </a:extLst>
           </p:cNvPr>
@@ -25259,10 +25291,10 @@
       </p:sp>
       <p:sp>
         <p:nvSpPr>
-          <p:cNvPr id="17" name="スライド番号プレースホルダー 16">
+          <p:cNvPr id="21" name="スライド番号プレースホルダー 20">
             <a:extLst>
               <a:ext uri="{FF2B5EF4-FFF2-40B4-BE49-F238E27FC236}">
-                <a16:creationId xmlns:a16="http://schemas.microsoft.com/office/drawing/2014/main" id="{8531D386-0963-4678-9BE7-60E60A11A60C}"/>
+                <a16:creationId xmlns:a16="http://schemas.microsoft.com/office/drawing/2014/main" id="{AE0686A1-7CC4-4AEB-9DAD-FDBB0EAF7E98}"/>
               </a:ext>
             </a:extLst>
           </p:cNvPr>
@@ -25815,10 +25847,10 @@
       </p:sp>
       <p:sp>
         <p:nvSpPr>
-          <p:cNvPr id="17" name="スライド番号プレースホルダー 16">
+          <p:cNvPr id="21" name="スライド番号プレースホルダー 20">
             <a:extLst>
               <a:ext uri="{FF2B5EF4-FFF2-40B4-BE49-F238E27FC236}">
-                <a16:creationId xmlns:a16="http://schemas.microsoft.com/office/drawing/2014/main" id="{37588AD6-F50B-44E9-B743-FF2A5AD62A0A}"/>
+                <a16:creationId xmlns:a16="http://schemas.microsoft.com/office/drawing/2014/main" id="{0F16B17D-1445-469D-8FC4-4F8E5134BA46}"/>
               </a:ext>
             </a:extLst>
           </p:cNvPr>
@@ -26595,10 +26627,10 @@
       </p:sp>
       <p:sp>
         <p:nvSpPr>
-          <p:cNvPr id="16" name="スライド番号プレースホルダー 15">
+          <p:cNvPr id="20" name="スライド番号プレースホルダー 19">
             <a:extLst>
               <a:ext uri="{FF2B5EF4-FFF2-40B4-BE49-F238E27FC236}">
-                <a16:creationId xmlns:a16="http://schemas.microsoft.com/office/drawing/2014/main" id="{7E8881E0-1D6B-4F08-B905-1D5B1B7CED0D}"/>
+                <a16:creationId xmlns:a16="http://schemas.microsoft.com/office/drawing/2014/main" id="{48DE470D-D279-4C54-9B45-1DB5E048AFBF}"/>
               </a:ext>
             </a:extLst>
           </p:cNvPr>
@@ -27170,10 +27202,10 @@
       </p:sp>
       <p:sp>
         <p:nvSpPr>
-          <p:cNvPr id="17" name="スライド番号プレースホルダー 16">
+          <p:cNvPr id="21" name="スライド番号プレースホルダー 20">
             <a:extLst>
               <a:ext uri="{FF2B5EF4-FFF2-40B4-BE49-F238E27FC236}">
-                <a16:creationId xmlns:a16="http://schemas.microsoft.com/office/drawing/2014/main" id="{E1B9E693-8055-4D93-A2FC-B96B9C2D6FD9}"/>
+                <a16:creationId xmlns:a16="http://schemas.microsoft.com/office/drawing/2014/main" id="{6B57C64E-6BBE-4F25-9F7D-FDB4D5A0388E}"/>
               </a:ext>
             </a:extLst>
           </p:cNvPr>
@@ -27733,10 +27765,10 @@
       </p:sp>
       <p:sp>
         <p:nvSpPr>
-          <p:cNvPr id="17" name="スライド番号プレースホルダー 16">
+          <p:cNvPr id="21" name="スライド番号プレースホルダー 20">
             <a:extLst>
               <a:ext uri="{FF2B5EF4-FFF2-40B4-BE49-F238E27FC236}">
-                <a16:creationId xmlns:a16="http://schemas.microsoft.com/office/drawing/2014/main" id="{BF4DF70A-C522-4C85-9784-DEC9D2E0EB48}"/>
+                <a16:creationId xmlns:a16="http://schemas.microsoft.com/office/drawing/2014/main" id="{D1DE015F-C5F0-4759-B79A-C1563036219A}"/>
               </a:ext>
             </a:extLst>
           </p:cNvPr>
@@ -28357,10 +28389,10 @@
       </p:sp>
       <p:sp>
         <p:nvSpPr>
-          <p:cNvPr id="17" name="スライド番号プレースホルダー 16">
+          <p:cNvPr id="21" name="スライド番号プレースホルダー 20">
             <a:extLst>
               <a:ext uri="{FF2B5EF4-FFF2-40B4-BE49-F238E27FC236}">
-                <a16:creationId xmlns:a16="http://schemas.microsoft.com/office/drawing/2014/main" id="{28E7E765-6B6F-4239-BD27-B814B4F023DD}"/>
+                <a16:creationId xmlns:a16="http://schemas.microsoft.com/office/drawing/2014/main" id="{D9214F9B-45B0-4794-989E-3C76D301D1E8}"/>
               </a:ext>
             </a:extLst>
           </p:cNvPr>
@@ -28882,10 +28914,10 @@
       </p:sp>
       <p:sp>
         <p:nvSpPr>
-          <p:cNvPr id="17" name="スライド番号プレースホルダー 16">
+          <p:cNvPr id="21" name="スライド番号プレースホルダー 20">
             <a:extLst>
               <a:ext uri="{FF2B5EF4-FFF2-40B4-BE49-F238E27FC236}">
-                <a16:creationId xmlns:a16="http://schemas.microsoft.com/office/drawing/2014/main" id="{47676016-C19D-462B-BE4A-66FF1A22357B}"/>
+                <a16:creationId xmlns:a16="http://schemas.microsoft.com/office/drawing/2014/main" id="{714BB5E0-85FD-4ABB-B2A5-3BBB96E6D401}"/>
               </a:ext>
             </a:extLst>
           </p:cNvPr>
@@ -29479,10 +29511,10 @@
       </p:sp>
       <p:sp>
         <p:nvSpPr>
-          <p:cNvPr id="17" name="スライド番号プレースホルダー 16">
+          <p:cNvPr id="21" name="スライド番号プレースホルダー 20">
             <a:extLst>
               <a:ext uri="{FF2B5EF4-FFF2-40B4-BE49-F238E27FC236}">
-                <a16:creationId xmlns:a16="http://schemas.microsoft.com/office/drawing/2014/main" id="{1A454CF6-28B1-4756-9666-02D74D596212}"/>
+                <a16:creationId xmlns:a16="http://schemas.microsoft.com/office/drawing/2014/main" id="{79B43A25-7F8D-415C-BC34-1CFE19759EEC}"/>
               </a:ext>
             </a:extLst>
           </p:cNvPr>
@@ -30018,10 +30050,10 @@
       </p:sp>
       <p:sp>
         <p:nvSpPr>
-          <p:cNvPr id="17" name="スライド番号プレースホルダー 16">
+          <p:cNvPr id="21" name="スライド番号プレースホルダー 20">
             <a:extLst>
               <a:ext uri="{FF2B5EF4-FFF2-40B4-BE49-F238E27FC236}">
-                <a16:creationId xmlns:a16="http://schemas.microsoft.com/office/drawing/2014/main" id="{3FED9959-5D06-4601-AC8B-C2BC3B8DDAFC}"/>
+                <a16:creationId xmlns:a16="http://schemas.microsoft.com/office/drawing/2014/main" id="{88C08C3A-82B5-4CAD-AC98-498F6C1363D0}"/>
               </a:ext>
             </a:extLst>
           </p:cNvPr>
@@ -30527,10 +30559,10 @@
       </p:sp>
       <p:sp>
         <p:nvSpPr>
-          <p:cNvPr id="16" name="スライド番号プレースホルダー 15">
+          <p:cNvPr id="20" name="スライド番号プレースホルダー 19">
             <a:extLst>
               <a:ext uri="{FF2B5EF4-FFF2-40B4-BE49-F238E27FC236}">
-                <a16:creationId xmlns:a16="http://schemas.microsoft.com/office/drawing/2014/main" id="{913F57F1-8C0C-4960-9D16-7455E73D5C1A}"/>
+                <a16:creationId xmlns:a16="http://schemas.microsoft.com/office/drawing/2014/main" id="{944039DD-3EEA-4D9D-B3FC-AAEF6853DF1C}"/>
               </a:ext>
             </a:extLst>
           </p:cNvPr>
@@ -31157,10 +31189,10 @@
       </p:sp>
       <p:sp>
         <p:nvSpPr>
-          <p:cNvPr id="17" name="スライド番号プレースホルダー 16">
+          <p:cNvPr id="21" name="スライド番号プレースホルダー 20">
             <a:extLst>
               <a:ext uri="{FF2B5EF4-FFF2-40B4-BE49-F238E27FC236}">
-                <a16:creationId xmlns:a16="http://schemas.microsoft.com/office/drawing/2014/main" id="{D7C635F3-F852-431E-9C32-FBFF2C73B3E0}"/>
+                <a16:creationId xmlns:a16="http://schemas.microsoft.com/office/drawing/2014/main" id="{657B6D9C-B6C1-44F1-8C12-94AD5C8EC599}"/>
               </a:ext>
             </a:extLst>
           </p:cNvPr>
@@ -31749,10 +31781,10 @@
       </p:sp>
       <p:sp>
         <p:nvSpPr>
-          <p:cNvPr id="17" name="スライド番号プレースホルダー 16">
+          <p:cNvPr id="21" name="スライド番号プレースホルダー 20">
             <a:extLst>
               <a:ext uri="{FF2B5EF4-FFF2-40B4-BE49-F238E27FC236}">
-                <a16:creationId xmlns:a16="http://schemas.microsoft.com/office/drawing/2014/main" id="{65C44FBD-A2E1-4B46-8260-5B488CA04260}"/>
+                <a16:creationId xmlns:a16="http://schemas.microsoft.com/office/drawing/2014/main" id="{ECE2DEE1-EE13-48F8-B897-FDA7050F392B}"/>
               </a:ext>
             </a:extLst>
           </p:cNvPr>
@@ -32360,10 +32392,10 @@
       </p:sp>
       <p:sp>
         <p:nvSpPr>
-          <p:cNvPr id="17" name="スライド番号プレースホルダー 16">
+          <p:cNvPr id="21" name="スライド番号プレースホルダー 20">
             <a:extLst>
               <a:ext uri="{FF2B5EF4-FFF2-40B4-BE49-F238E27FC236}">
-                <a16:creationId xmlns:a16="http://schemas.microsoft.com/office/drawing/2014/main" id="{917D837D-8076-4B32-B2F9-F2EEA116EC25}"/>
+                <a16:creationId xmlns:a16="http://schemas.microsoft.com/office/drawing/2014/main" id="{10DE6605-B03D-4A26-B6BE-BF2D4B1FF79C}"/>
               </a:ext>
             </a:extLst>
           </p:cNvPr>
@@ -32915,10 +32947,10 @@
       </p:sp>
       <p:sp>
         <p:nvSpPr>
-          <p:cNvPr id="17" name="スライド番号プレースホルダー 16">
+          <p:cNvPr id="21" name="スライド番号プレースホルダー 20">
             <a:extLst>
               <a:ext uri="{FF2B5EF4-FFF2-40B4-BE49-F238E27FC236}">
-                <a16:creationId xmlns:a16="http://schemas.microsoft.com/office/drawing/2014/main" id="{E36D7521-9887-422F-AD8F-D26E3FC5697F}"/>
+                <a16:creationId xmlns:a16="http://schemas.microsoft.com/office/drawing/2014/main" id="{C37B754B-4F28-4ECB-A453-E0589F2A2F87}"/>
               </a:ext>
             </a:extLst>
           </p:cNvPr>
@@ -33449,10 +33481,10 @@
       </p:sp>
       <p:sp>
         <p:nvSpPr>
-          <p:cNvPr id="17" name="スライド番号プレースホルダー 16">
+          <p:cNvPr id="21" name="スライド番号プレースホルダー 20">
             <a:extLst>
               <a:ext uri="{FF2B5EF4-FFF2-40B4-BE49-F238E27FC236}">
-                <a16:creationId xmlns:a16="http://schemas.microsoft.com/office/drawing/2014/main" id="{9799E63C-A780-4618-BF37-4467B80DBFA9}"/>
+                <a16:creationId xmlns:a16="http://schemas.microsoft.com/office/drawing/2014/main" id="{816BE19B-5420-4570-B8B7-F5209652DCED}"/>
               </a:ext>
             </a:extLst>
           </p:cNvPr>
@@ -33994,10 +34026,10 @@
       </p:sp>
       <p:sp>
         <p:nvSpPr>
-          <p:cNvPr id="17" name="スライド番号プレースホルダー 16">
+          <p:cNvPr id="21" name="スライド番号プレースホルダー 20">
             <a:extLst>
               <a:ext uri="{FF2B5EF4-FFF2-40B4-BE49-F238E27FC236}">
-                <a16:creationId xmlns:a16="http://schemas.microsoft.com/office/drawing/2014/main" id="{FDC3EBFD-2A1D-47CC-ADEC-9422870D9F27}"/>
+                <a16:creationId xmlns:a16="http://schemas.microsoft.com/office/drawing/2014/main" id="{F44A2D61-0A51-4EFA-AF66-A0AAB7138393}"/>
               </a:ext>
             </a:extLst>
           </p:cNvPr>
@@ -34682,10 +34714,10 @@
       </p:sp>
       <p:sp>
         <p:nvSpPr>
-          <p:cNvPr id="17" name="スライド番号プレースホルダー 16">
+          <p:cNvPr id="21" name="スライド番号プレースホルダー 20">
             <a:extLst>
               <a:ext uri="{FF2B5EF4-FFF2-40B4-BE49-F238E27FC236}">
-                <a16:creationId xmlns:a16="http://schemas.microsoft.com/office/drawing/2014/main" id="{C7623001-01EB-46F2-B450-3EBFF147CA85}"/>
+                <a16:creationId xmlns:a16="http://schemas.microsoft.com/office/drawing/2014/main" id="{CC500F49-4BA7-4DD5-ADB4-2A84AF6413F6}"/>
               </a:ext>
             </a:extLst>
           </p:cNvPr>
@@ -35294,10 +35326,10 @@
       </p:sp>
       <p:sp>
         <p:nvSpPr>
-          <p:cNvPr id="18" name="スライド番号プレースホルダー 17">
+          <p:cNvPr id="22" name="スライド番号プレースホルダー 21">
             <a:extLst>
               <a:ext uri="{FF2B5EF4-FFF2-40B4-BE49-F238E27FC236}">
-                <a16:creationId xmlns:a16="http://schemas.microsoft.com/office/drawing/2014/main" id="{B630DDB7-EA2F-4308-8AB4-2B34CBA28FA3}"/>
+                <a16:creationId xmlns:a16="http://schemas.microsoft.com/office/drawing/2014/main" id="{BAB77182-D05F-4D6E-BFD6-1536112B9C26}"/>
               </a:ext>
             </a:extLst>
           </p:cNvPr>
@@ -35929,10 +35961,10 @@
       </p:sp>
       <p:sp>
         <p:nvSpPr>
-          <p:cNvPr id="17" name="スライド番号プレースホルダー 16">
+          <p:cNvPr id="21" name="スライド番号プレースホルダー 20">
             <a:extLst>
               <a:ext uri="{FF2B5EF4-FFF2-40B4-BE49-F238E27FC236}">
-                <a16:creationId xmlns:a16="http://schemas.microsoft.com/office/drawing/2014/main" id="{7B68DFEE-9A02-4F01-89F1-33871EC902AB}"/>
+                <a16:creationId xmlns:a16="http://schemas.microsoft.com/office/drawing/2014/main" id="{1FF8B5B1-DBCE-4780-AED5-B8009FC4BE02}"/>
               </a:ext>
             </a:extLst>
           </p:cNvPr>
@@ -36510,10 +36542,10 @@
       </p:sp>
       <p:sp>
         <p:nvSpPr>
-          <p:cNvPr id="17" name="スライド番号プレースホルダー 16">
+          <p:cNvPr id="21" name="スライド番号プレースホルダー 20">
             <a:extLst>
               <a:ext uri="{FF2B5EF4-FFF2-40B4-BE49-F238E27FC236}">
-                <a16:creationId xmlns:a16="http://schemas.microsoft.com/office/drawing/2014/main" id="{583A7A52-5075-466A-BEB4-21EFED142C3A}"/>
+                <a16:creationId xmlns:a16="http://schemas.microsoft.com/office/drawing/2014/main" id="{EBEA6CF3-5103-4783-B49E-F221C5F2A55D}"/>
               </a:ext>
             </a:extLst>
           </p:cNvPr>
@@ -37054,10 +37086,10 @@
       </p:sp>
       <p:sp>
         <p:nvSpPr>
-          <p:cNvPr id="17" name="スライド番号プレースホルダー 16">
+          <p:cNvPr id="21" name="スライド番号プレースホルダー 20">
             <a:extLst>
               <a:ext uri="{FF2B5EF4-FFF2-40B4-BE49-F238E27FC236}">
-                <a16:creationId xmlns:a16="http://schemas.microsoft.com/office/drawing/2014/main" id="{18DDB2D0-3317-4BDE-A97E-CC2D91F0DFC1}"/>
+                <a16:creationId xmlns:a16="http://schemas.microsoft.com/office/drawing/2014/main" id="{4147A3F5-1C15-4F5C-82F9-BD041F6B9554}"/>
               </a:ext>
             </a:extLst>
           </p:cNvPr>
@@ -37586,10 +37618,10 @@
       </p:sp>
       <p:sp>
         <p:nvSpPr>
-          <p:cNvPr id="17" name="スライド番号プレースホルダー 16">
+          <p:cNvPr id="21" name="スライド番号プレースホルダー 20">
             <a:extLst>
               <a:ext uri="{FF2B5EF4-FFF2-40B4-BE49-F238E27FC236}">
-                <a16:creationId xmlns:a16="http://schemas.microsoft.com/office/drawing/2014/main" id="{E4D9D567-23FA-473A-B9C5-6CDAEFB8D31E}"/>
+                <a16:creationId xmlns:a16="http://schemas.microsoft.com/office/drawing/2014/main" id="{1018A4E3-A451-4AC6-B825-37595A58619D}"/>
               </a:ext>
             </a:extLst>
           </p:cNvPr>
@@ -38183,10 +38215,10 @@
       </p:sp>
       <p:sp>
         <p:nvSpPr>
-          <p:cNvPr id="17" name="スライド番号プレースホルダー 16">
+          <p:cNvPr id="21" name="スライド番号プレースホルダー 20">
             <a:extLst>
               <a:ext uri="{FF2B5EF4-FFF2-40B4-BE49-F238E27FC236}">
-                <a16:creationId xmlns:a16="http://schemas.microsoft.com/office/drawing/2014/main" id="{48441F26-A194-4D79-8E07-BB0D284CF575}"/>
+                <a16:creationId xmlns:a16="http://schemas.microsoft.com/office/drawing/2014/main" id="{7B6C7C25-2E2C-477E-84A9-4D7B69609325}"/>
               </a:ext>
             </a:extLst>
           </p:cNvPr>
@@ -38487,10 +38519,10 @@
       </p:sp>
       <p:sp>
         <p:nvSpPr>
-          <p:cNvPr id="11" name="スライド番号プレースホルダー 10">
+          <p:cNvPr id="15" name="スライド番号プレースホルダー 14">
             <a:extLst>
               <a:ext uri="{FF2B5EF4-FFF2-40B4-BE49-F238E27FC236}">
-                <a16:creationId xmlns:a16="http://schemas.microsoft.com/office/drawing/2014/main" id="{20B40B25-ED90-48AE-A02E-7BFFB8D5D1BA}"/>
+                <a16:creationId xmlns:a16="http://schemas.microsoft.com/office/drawing/2014/main" id="{BCF43DB9-7EDE-4FBC-B9A6-5E98BC164CF6}"/>
               </a:ext>
             </a:extLst>
           </p:cNvPr>
@@ -39337,10 +39369,10 @@
       </p:sp>
       <p:sp>
         <p:nvSpPr>
-          <p:cNvPr id="18" name="スライド番号プレースホルダー 17">
+          <p:cNvPr id="22" name="スライド番号プレースホルダー 21">
             <a:extLst>
               <a:ext uri="{FF2B5EF4-FFF2-40B4-BE49-F238E27FC236}">
-                <a16:creationId xmlns:a16="http://schemas.microsoft.com/office/drawing/2014/main" id="{B30FA8CF-19A5-42B7-B809-832FD493C1F3}"/>
+                <a16:creationId xmlns:a16="http://schemas.microsoft.com/office/drawing/2014/main" id="{497DE090-F4E5-4F85-99B9-81E7590FA80F}"/>
               </a:ext>
             </a:extLst>
           </p:cNvPr>
@@ -39946,10 +39978,10 @@
       </p:sp>
       <p:sp>
         <p:nvSpPr>
-          <p:cNvPr id="17" name="スライド番号プレースホルダー 16">
+          <p:cNvPr id="21" name="スライド番号プレースホルダー 20">
             <a:extLst>
               <a:ext uri="{FF2B5EF4-FFF2-40B4-BE49-F238E27FC236}">
-                <a16:creationId xmlns:a16="http://schemas.microsoft.com/office/drawing/2014/main" id="{A73B4A02-42CA-46E6-9A89-2D688F53BBFB}"/>
+                <a16:creationId xmlns:a16="http://schemas.microsoft.com/office/drawing/2014/main" id="{ACE1AB47-4E45-4B95-8BA9-6FEC11F3695C}"/>
               </a:ext>
             </a:extLst>
           </p:cNvPr>
@@ -40516,10 +40548,10 @@
       </p:sp>
       <p:sp>
         <p:nvSpPr>
-          <p:cNvPr id="17" name="スライド番号プレースホルダー 16">
+          <p:cNvPr id="21" name="スライド番号プレースホルダー 20">
             <a:extLst>
               <a:ext uri="{FF2B5EF4-FFF2-40B4-BE49-F238E27FC236}">
-                <a16:creationId xmlns:a16="http://schemas.microsoft.com/office/drawing/2014/main" id="{0EF38626-A446-46D6-B746-6AF0A1D014EE}"/>
+                <a16:creationId xmlns:a16="http://schemas.microsoft.com/office/drawing/2014/main" id="{182864BA-F8E4-4122-B176-013B58EBC16A}"/>
               </a:ext>
             </a:extLst>
           </p:cNvPr>
@@ -41100,10 +41132,10 @@
       </p:sp>
       <p:sp>
         <p:nvSpPr>
-          <p:cNvPr id="17" name="スライド番号プレースホルダー 16">
+          <p:cNvPr id="21" name="スライド番号プレースホルダー 20">
             <a:extLst>
               <a:ext uri="{FF2B5EF4-FFF2-40B4-BE49-F238E27FC236}">
-                <a16:creationId xmlns:a16="http://schemas.microsoft.com/office/drawing/2014/main" id="{9DCE5E1D-614A-454B-9912-FCC0B5F8953A}"/>
+                <a16:creationId xmlns:a16="http://schemas.microsoft.com/office/drawing/2014/main" id="{CC78E268-2F47-461E-9913-D88DAE69D49C}"/>
               </a:ext>
             </a:extLst>
           </p:cNvPr>

</xml_diff>